<commit_message>
adding final pp and new graphs
</commit_message>
<xml_diff>
--- a/Recession and Expansion.pptx
+++ b/Recession and Expansion.pptx
@@ -9,6 +9,14 @@
     <p:sldId id="257" r:id="rId3"/>
     <p:sldId id="258" r:id="rId4"/>
     <p:sldId id="259" r:id="rId5"/>
+    <p:sldId id="266" r:id="rId6"/>
+    <p:sldId id="267" r:id="rId7"/>
+    <p:sldId id="260" r:id="rId8"/>
+    <p:sldId id="261" r:id="rId9"/>
+    <p:sldId id="262" r:id="rId10"/>
+    <p:sldId id="263" r:id="rId11"/>
+    <p:sldId id="264" r:id="rId12"/>
+    <p:sldId id="265" r:id="rId13"/>
   </p:sldIdLst>
   <p:sldSz cx="12192000" cy="6858000"/>
   <p:notesSz cx="6858000" cy="9144000"/>
@@ -107,6 +115,11 @@
       </a:defRPr>
     </a:lvl9pPr>
   </p:defaultTextStyle>
+  <p:extLst>
+    <p:ext uri="{EFAFB233-063F-42B5-8137-9DF3F51BA10A}">
+      <p15:sldGuideLst xmlns:p15="http://schemas.microsoft.com/office/powerpoint/2012/main"/>
+    </p:ext>
+  </p:extLst>
 </p:presentation>
 </file>
 
@@ -257,7 +270,7 @@
           <a:p>
             <a:fld id="{CAF37126-3F04-4A5B-B793-3080D2159B92}" type="datetimeFigureOut">
               <a:rPr lang="en-US" smtClean="0"/>
-              <a:t>2/1/2019</a:t>
+              <a:t>2/2/2019</a:t>
             </a:fld>
             <a:endParaRPr lang="en-US"/>
           </a:p>
@@ -455,7 +468,7 @@
           <a:p>
             <a:fld id="{CAF37126-3F04-4A5B-B793-3080D2159B92}" type="datetimeFigureOut">
               <a:rPr lang="en-US" smtClean="0"/>
-              <a:t>2/1/2019</a:t>
+              <a:t>2/2/2019</a:t>
             </a:fld>
             <a:endParaRPr lang="en-US"/>
           </a:p>
@@ -663,7 +676,7 @@
           <a:p>
             <a:fld id="{CAF37126-3F04-4A5B-B793-3080D2159B92}" type="datetimeFigureOut">
               <a:rPr lang="en-US" smtClean="0"/>
-              <a:t>2/1/2019</a:t>
+              <a:t>2/2/2019</a:t>
             </a:fld>
             <a:endParaRPr lang="en-US"/>
           </a:p>
@@ -861,7 +874,7 @@
           <a:p>
             <a:fld id="{CAF37126-3F04-4A5B-B793-3080D2159B92}" type="datetimeFigureOut">
               <a:rPr lang="en-US" smtClean="0"/>
-              <a:t>2/1/2019</a:t>
+              <a:t>2/2/2019</a:t>
             </a:fld>
             <a:endParaRPr lang="en-US"/>
           </a:p>
@@ -1136,7 +1149,7 @@
           <a:p>
             <a:fld id="{CAF37126-3F04-4A5B-B793-3080D2159B92}" type="datetimeFigureOut">
               <a:rPr lang="en-US" smtClean="0"/>
-              <a:t>2/1/2019</a:t>
+              <a:t>2/2/2019</a:t>
             </a:fld>
             <a:endParaRPr lang="en-US"/>
           </a:p>
@@ -1401,7 +1414,7 @@
           <a:p>
             <a:fld id="{CAF37126-3F04-4A5B-B793-3080D2159B92}" type="datetimeFigureOut">
               <a:rPr lang="en-US" smtClean="0"/>
-              <a:t>2/1/2019</a:t>
+              <a:t>2/2/2019</a:t>
             </a:fld>
             <a:endParaRPr lang="en-US"/>
           </a:p>
@@ -1813,7 +1826,7 @@
           <a:p>
             <a:fld id="{CAF37126-3F04-4A5B-B793-3080D2159B92}" type="datetimeFigureOut">
               <a:rPr lang="en-US" smtClean="0"/>
-              <a:t>2/1/2019</a:t>
+              <a:t>2/2/2019</a:t>
             </a:fld>
             <a:endParaRPr lang="en-US"/>
           </a:p>
@@ -1954,7 +1967,7 @@
           <a:p>
             <a:fld id="{CAF37126-3F04-4A5B-B793-3080D2159B92}" type="datetimeFigureOut">
               <a:rPr lang="en-US" smtClean="0"/>
-              <a:t>2/1/2019</a:t>
+              <a:t>2/2/2019</a:t>
             </a:fld>
             <a:endParaRPr lang="en-US"/>
           </a:p>
@@ -2067,7 +2080,7 @@
           <a:p>
             <a:fld id="{CAF37126-3F04-4A5B-B793-3080D2159B92}" type="datetimeFigureOut">
               <a:rPr lang="en-US" smtClean="0"/>
-              <a:t>2/1/2019</a:t>
+              <a:t>2/2/2019</a:t>
             </a:fld>
             <a:endParaRPr lang="en-US"/>
           </a:p>
@@ -2378,7 +2391,7 @@
           <a:p>
             <a:fld id="{CAF37126-3F04-4A5B-B793-3080D2159B92}" type="datetimeFigureOut">
               <a:rPr lang="en-US" smtClean="0"/>
-              <a:t>2/1/2019</a:t>
+              <a:t>2/2/2019</a:t>
             </a:fld>
             <a:endParaRPr lang="en-US"/>
           </a:p>
@@ -2666,7 +2679,7 @@
           <a:p>
             <a:fld id="{CAF37126-3F04-4A5B-B793-3080D2159B92}" type="datetimeFigureOut">
               <a:rPr lang="en-US" smtClean="0"/>
-              <a:t>2/1/2019</a:t>
+              <a:t>2/2/2019</a:t>
             </a:fld>
             <a:endParaRPr lang="en-US"/>
           </a:p>
@@ -2907,7 +2920,7 @@
           <a:p>
             <a:fld id="{CAF37126-3F04-4A5B-B793-3080D2159B92}" type="datetimeFigureOut">
               <a:rPr lang="en-US" smtClean="0"/>
-              <a:t>2/1/2019</a:t>
+              <a:t>2/2/2019</a:t>
             </a:fld>
             <a:endParaRPr lang="en-US"/>
           </a:p>
@@ -3653,6 +3666,1027 @@
 </p:sld>
 </file>
 
+<file path=ppt/slides/slide10.xml><?xml version="1.0" encoding="utf-8"?>
+<p:sld xmlns:a="http://schemas.openxmlformats.org/drawingml/2006/main" xmlns:r="http://schemas.openxmlformats.org/officeDocument/2006/relationships" xmlns:p="http://schemas.openxmlformats.org/presentationml/2006/main">
+  <p:cSld>
+    <p:bg>
+      <p:bgPr>
+        <a:blipFill dpi="0" rotWithShape="1">
+          <a:blip r:embed="rId2">
+            <a:alphaModFix amt="41000"/>
+            <a:lum/>
+          </a:blip>
+          <a:srcRect/>
+          <a:stretch>
+            <a:fillRect t="-9000" b="-9000"/>
+          </a:stretch>
+        </a:blipFill>
+        <a:effectLst/>
+      </p:bgPr>
+    </p:bg>
+    <p:spTree>
+      <p:nvGrpSpPr>
+        <p:cNvPr id="1" name=""/>
+        <p:cNvGrpSpPr/>
+        <p:nvPr/>
+      </p:nvGrpSpPr>
+      <p:grpSpPr>
+        <a:xfrm>
+          <a:off x="0" y="0"/>
+          <a:ext cx="0" cy="0"/>
+          <a:chOff x="0" y="0"/>
+          <a:chExt cx="0" cy="0"/>
+        </a:xfrm>
+      </p:grpSpPr>
+      <p:sp>
+        <p:nvSpPr>
+          <p:cNvPr id="2" name="Title 1">
+            <a:extLst>
+              <a:ext uri="{FF2B5EF4-FFF2-40B4-BE49-F238E27FC236}">
+                <a16:creationId xmlns:a16="http://schemas.microsoft.com/office/drawing/2014/main" id="{EB63F8CA-BCBA-4BB7-ACBB-02B3D688E55D}"/>
+              </a:ext>
+            </a:extLst>
+          </p:cNvPr>
+          <p:cNvSpPr>
+            <a:spLocks noGrp="1"/>
+          </p:cNvSpPr>
+          <p:nvPr>
+            <p:ph type="title"/>
+          </p:nvPr>
+        </p:nvSpPr>
+        <p:spPr/>
+        <p:txBody>
+          <a:bodyPr/>
+          <a:lstStyle/>
+          <a:p>
+            <a:r>
+              <a:rPr lang="en-US" b="1" dirty="0"/>
+              <a:t>Third Test</a:t>
+            </a:r>
+          </a:p>
+        </p:txBody>
+      </p:sp>
+      <p:pic>
+        <p:nvPicPr>
+          <p:cNvPr id="6" name="Content Placeholder 5">
+            <a:extLst>
+              <a:ext uri="{FF2B5EF4-FFF2-40B4-BE49-F238E27FC236}">
+                <a16:creationId xmlns:a16="http://schemas.microsoft.com/office/drawing/2014/main" id="{FB4946DF-640D-4186-8703-35068AA38EFA}"/>
+              </a:ext>
+            </a:extLst>
+          </p:cNvPr>
+          <p:cNvPicPr>
+            <a:picLocks noGrp="1" noChangeAspect="1"/>
+          </p:cNvPicPr>
+          <p:nvPr>
+            <p:ph idx="1"/>
+          </p:nvPr>
+        </p:nvPicPr>
+        <p:blipFill>
+          <a:blip r:embed="rId3">
+            <a:extLst>
+              <a:ext uri="{28A0092B-C50C-407E-A947-70E740481C1C}">
+                <a14:useLocalDpi xmlns:a14="http://schemas.microsoft.com/office/drawing/2010/main" val="0"/>
+              </a:ext>
+            </a:extLst>
+          </a:blip>
+          <a:stretch>
+            <a:fillRect/>
+          </a:stretch>
+        </p:blipFill>
+        <p:spPr>
+          <a:xfrm>
+            <a:off x="2666521" y="1690688"/>
+            <a:ext cx="3429479" cy="1667108"/>
+          </a:xfrm>
+        </p:spPr>
+      </p:pic>
+      <p:pic>
+        <p:nvPicPr>
+          <p:cNvPr id="9" name="Picture 8">
+            <a:extLst>
+              <a:ext uri="{FF2B5EF4-FFF2-40B4-BE49-F238E27FC236}">
+                <a16:creationId xmlns:a16="http://schemas.microsoft.com/office/drawing/2014/main" id="{CBBFCBEF-F5B2-4C47-B8E4-ED243F3A7089}"/>
+              </a:ext>
+            </a:extLst>
+          </p:cNvPr>
+          <p:cNvPicPr>
+            <a:picLocks noChangeAspect="1"/>
+          </p:cNvPicPr>
+          <p:nvPr/>
+        </p:nvPicPr>
+        <p:blipFill>
+          <a:blip r:embed="rId4">
+            <a:extLst>
+              <a:ext uri="{28A0092B-C50C-407E-A947-70E740481C1C}">
+                <a14:useLocalDpi xmlns:a14="http://schemas.microsoft.com/office/drawing/2010/main" val="0"/>
+              </a:ext>
+            </a:extLst>
+          </a:blip>
+          <a:stretch>
+            <a:fillRect/>
+          </a:stretch>
+        </p:blipFill>
+        <p:spPr>
+          <a:xfrm>
+            <a:off x="6096000" y="1690688"/>
+            <a:ext cx="4934639" cy="2619741"/>
+          </a:xfrm>
+          <a:prstGeom prst="rect">
+            <a:avLst/>
+          </a:prstGeom>
+        </p:spPr>
+      </p:pic>
+    </p:spTree>
+    <p:extLst>
+      <p:ext uri="{BB962C8B-B14F-4D97-AF65-F5344CB8AC3E}">
+        <p14:creationId xmlns:p14="http://schemas.microsoft.com/office/powerpoint/2010/main" val="1442262528"/>
+      </p:ext>
+    </p:extLst>
+  </p:cSld>
+  <p:clrMapOvr>
+    <a:masterClrMapping/>
+  </p:clrMapOvr>
+  <p:timing>
+    <p:tnLst>
+      <p:par>
+        <p:cTn id="1" dur="indefinite" restart="never" nodeType="tmRoot">
+          <p:childTnLst>
+            <p:seq concurrent="1" nextAc="seek">
+              <p:cTn id="2" dur="indefinite" nodeType="mainSeq">
+                <p:childTnLst>
+                  <p:par>
+                    <p:cTn id="3" fill="hold">
+                      <p:stCondLst>
+                        <p:cond delay="indefinite"/>
+                      </p:stCondLst>
+                      <p:childTnLst>
+                        <p:par>
+                          <p:cTn id="4" fill="hold">
+                            <p:stCondLst>
+                              <p:cond delay="0"/>
+                            </p:stCondLst>
+                            <p:childTnLst>
+                              <p:par>
+                                <p:cTn id="5" presetID="2" presetClass="entr" presetSubtype="4" fill="hold" nodeType="clickEffect">
+                                  <p:stCondLst>
+                                    <p:cond delay="0"/>
+                                  </p:stCondLst>
+                                  <p:childTnLst>
+                                    <p:set>
+                                      <p:cBhvr>
+                                        <p:cTn id="6" dur="1" fill="hold">
+                                          <p:stCondLst>
+                                            <p:cond delay="0"/>
+                                          </p:stCondLst>
+                                        </p:cTn>
+                                        <p:tgtEl>
+                                          <p:spTgt spid="6"/>
+                                        </p:tgtEl>
+                                        <p:attrNameLst>
+                                          <p:attrName>style.visibility</p:attrName>
+                                        </p:attrNameLst>
+                                      </p:cBhvr>
+                                      <p:to>
+                                        <p:strVal val="visible"/>
+                                      </p:to>
+                                    </p:set>
+                                    <p:anim calcmode="lin" valueType="num">
+                                      <p:cBhvr additive="base">
+                                        <p:cTn id="7" dur="500" fill="hold"/>
+                                        <p:tgtEl>
+                                          <p:spTgt spid="6"/>
+                                        </p:tgtEl>
+                                        <p:attrNameLst>
+                                          <p:attrName>ppt_x</p:attrName>
+                                        </p:attrNameLst>
+                                      </p:cBhvr>
+                                      <p:tavLst>
+                                        <p:tav tm="0">
+                                          <p:val>
+                                            <p:strVal val="#ppt_x"/>
+                                          </p:val>
+                                        </p:tav>
+                                        <p:tav tm="100000">
+                                          <p:val>
+                                            <p:strVal val="#ppt_x"/>
+                                          </p:val>
+                                        </p:tav>
+                                      </p:tavLst>
+                                    </p:anim>
+                                    <p:anim calcmode="lin" valueType="num">
+                                      <p:cBhvr additive="base">
+                                        <p:cTn id="8" dur="500" fill="hold"/>
+                                        <p:tgtEl>
+                                          <p:spTgt spid="6"/>
+                                        </p:tgtEl>
+                                        <p:attrNameLst>
+                                          <p:attrName>ppt_y</p:attrName>
+                                        </p:attrNameLst>
+                                      </p:cBhvr>
+                                      <p:tavLst>
+                                        <p:tav tm="0">
+                                          <p:val>
+                                            <p:strVal val="1+#ppt_h/2"/>
+                                          </p:val>
+                                        </p:tav>
+                                        <p:tav tm="100000">
+                                          <p:val>
+                                            <p:strVal val="#ppt_y"/>
+                                          </p:val>
+                                        </p:tav>
+                                      </p:tavLst>
+                                    </p:anim>
+                                  </p:childTnLst>
+                                </p:cTn>
+                              </p:par>
+                            </p:childTnLst>
+                          </p:cTn>
+                        </p:par>
+                      </p:childTnLst>
+                    </p:cTn>
+                  </p:par>
+                  <p:par>
+                    <p:cTn id="9" fill="hold">
+                      <p:stCondLst>
+                        <p:cond delay="indefinite"/>
+                      </p:stCondLst>
+                      <p:childTnLst>
+                        <p:par>
+                          <p:cTn id="10" fill="hold">
+                            <p:stCondLst>
+                              <p:cond delay="0"/>
+                            </p:stCondLst>
+                            <p:childTnLst>
+                              <p:par>
+                                <p:cTn id="11" presetID="2" presetClass="entr" presetSubtype="4" fill="hold" nodeType="clickEffect">
+                                  <p:stCondLst>
+                                    <p:cond delay="0"/>
+                                  </p:stCondLst>
+                                  <p:childTnLst>
+                                    <p:set>
+                                      <p:cBhvr>
+                                        <p:cTn id="12" dur="1" fill="hold">
+                                          <p:stCondLst>
+                                            <p:cond delay="0"/>
+                                          </p:stCondLst>
+                                        </p:cTn>
+                                        <p:tgtEl>
+                                          <p:spTgt spid="9"/>
+                                        </p:tgtEl>
+                                        <p:attrNameLst>
+                                          <p:attrName>style.visibility</p:attrName>
+                                        </p:attrNameLst>
+                                      </p:cBhvr>
+                                      <p:to>
+                                        <p:strVal val="visible"/>
+                                      </p:to>
+                                    </p:set>
+                                    <p:anim calcmode="lin" valueType="num">
+                                      <p:cBhvr additive="base">
+                                        <p:cTn id="13" dur="500" fill="hold"/>
+                                        <p:tgtEl>
+                                          <p:spTgt spid="9"/>
+                                        </p:tgtEl>
+                                        <p:attrNameLst>
+                                          <p:attrName>ppt_x</p:attrName>
+                                        </p:attrNameLst>
+                                      </p:cBhvr>
+                                      <p:tavLst>
+                                        <p:tav tm="0">
+                                          <p:val>
+                                            <p:strVal val="#ppt_x"/>
+                                          </p:val>
+                                        </p:tav>
+                                        <p:tav tm="100000">
+                                          <p:val>
+                                            <p:strVal val="#ppt_x"/>
+                                          </p:val>
+                                        </p:tav>
+                                      </p:tavLst>
+                                    </p:anim>
+                                    <p:anim calcmode="lin" valueType="num">
+                                      <p:cBhvr additive="base">
+                                        <p:cTn id="14" dur="500" fill="hold"/>
+                                        <p:tgtEl>
+                                          <p:spTgt spid="9"/>
+                                        </p:tgtEl>
+                                        <p:attrNameLst>
+                                          <p:attrName>ppt_y</p:attrName>
+                                        </p:attrNameLst>
+                                      </p:cBhvr>
+                                      <p:tavLst>
+                                        <p:tav tm="0">
+                                          <p:val>
+                                            <p:strVal val="1+#ppt_h/2"/>
+                                          </p:val>
+                                        </p:tav>
+                                        <p:tav tm="100000">
+                                          <p:val>
+                                            <p:strVal val="#ppt_y"/>
+                                          </p:val>
+                                        </p:tav>
+                                      </p:tavLst>
+                                    </p:anim>
+                                  </p:childTnLst>
+                                </p:cTn>
+                              </p:par>
+                            </p:childTnLst>
+                          </p:cTn>
+                        </p:par>
+                      </p:childTnLst>
+                    </p:cTn>
+                  </p:par>
+                </p:childTnLst>
+              </p:cTn>
+              <p:prevCondLst>
+                <p:cond evt="onPrev" delay="0">
+                  <p:tgtEl>
+                    <p:sldTgt/>
+                  </p:tgtEl>
+                </p:cond>
+              </p:prevCondLst>
+              <p:nextCondLst>
+                <p:cond evt="onNext" delay="0">
+                  <p:tgtEl>
+                    <p:sldTgt/>
+                  </p:tgtEl>
+                </p:cond>
+              </p:nextCondLst>
+            </p:seq>
+          </p:childTnLst>
+        </p:cTn>
+      </p:par>
+    </p:tnLst>
+  </p:timing>
+</p:sld>
+</file>
+
+<file path=ppt/slides/slide11.xml><?xml version="1.0" encoding="utf-8"?>
+<p:sld xmlns:a="http://schemas.openxmlformats.org/drawingml/2006/main" xmlns:r="http://schemas.openxmlformats.org/officeDocument/2006/relationships" xmlns:p="http://schemas.openxmlformats.org/presentationml/2006/main">
+  <p:cSld>
+    <p:bg>
+      <p:bgPr>
+        <a:blipFill dpi="0" rotWithShape="1">
+          <a:blip r:embed="rId2">
+            <a:alphaModFix amt="41000"/>
+            <a:lum/>
+          </a:blip>
+          <a:srcRect/>
+          <a:stretch>
+            <a:fillRect t="-9000" b="-9000"/>
+          </a:stretch>
+        </a:blipFill>
+        <a:effectLst/>
+      </p:bgPr>
+    </p:bg>
+    <p:spTree>
+      <p:nvGrpSpPr>
+        <p:cNvPr id="1" name=""/>
+        <p:cNvGrpSpPr/>
+        <p:nvPr/>
+      </p:nvGrpSpPr>
+      <p:grpSpPr>
+        <a:xfrm>
+          <a:off x="0" y="0"/>
+          <a:ext cx="0" cy="0"/>
+          <a:chOff x="0" y="0"/>
+          <a:chExt cx="0" cy="0"/>
+        </a:xfrm>
+      </p:grpSpPr>
+      <p:sp>
+        <p:nvSpPr>
+          <p:cNvPr id="2" name="Title 1">
+            <a:extLst>
+              <a:ext uri="{FF2B5EF4-FFF2-40B4-BE49-F238E27FC236}">
+                <a16:creationId xmlns:a16="http://schemas.microsoft.com/office/drawing/2014/main" id="{EB63F8CA-BCBA-4BB7-ACBB-02B3D688E55D}"/>
+              </a:ext>
+            </a:extLst>
+          </p:cNvPr>
+          <p:cNvSpPr>
+            <a:spLocks noGrp="1"/>
+          </p:cNvSpPr>
+          <p:nvPr>
+            <p:ph type="title"/>
+          </p:nvPr>
+        </p:nvSpPr>
+        <p:spPr/>
+        <p:txBody>
+          <a:bodyPr/>
+          <a:lstStyle/>
+          <a:p>
+            <a:r>
+              <a:rPr lang="en-US" b="1" dirty="0"/>
+              <a:t>New Data Hook Up</a:t>
+            </a:r>
+          </a:p>
+        </p:txBody>
+      </p:sp>
+      <p:pic>
+        <p:nvPicPr>
+          <p:cNvPr id="7" name="Content Placeholder 6">
+            <a:extLst>
+              <a:ext uri="{FF2B5EF4-FFF2-40B4-BE49-F238E27FC236}">
+                <a16:creationId xmlns:a16="http://schemas.microsoft.com/office/drawing/2014/main" id="{FAA9FC09-04B2-49FE-8E0E-0D40D73DDC88}"/>
+              </a:ext>
+            </a:extLst>
+          </p:cNvPr>
+          <p:cNvPicPr>
+            <a:picLocks noGrp="1" noChangeAspect="1"/>
+          </p:cNvPicPr>
+          <p:nvPr>
+            <p:ph idx="1"/>
+          </p:nvPr>
+        </p:nvPicPr>
+        <p:blipFill>
+          <a:blip r:embed="rId3">
+            <a:extLst>
+              <a:ext uri="{28A0092B-C50C-407E-A947-70E740481C1C}">
+                <a14:useLocalDpi xmlns:a14="http://schemas.microsoft.com/office/drawing/2010/main" val="0"/>
+              </a:ext>
+            </a:extLst>
+          </a:blip>
+          <a:stretch>
+            <a:fillRect/>
+          </a:stretch>
+        </p:blipFill>
+        <p:spPr>
+          <a:xfrm>
+            <a:off x="1952046" y="2128656"/>
+            <a:ext cx="8287907" cy="2600688"/>
+          </a:xfrm>
+        </p:spPr>
+      </p:pic>
+    </p:spTree>
+    <p:extLst>
+      <p:ext uri="{BB962C8B-B14F-4D97-AF65-F5344CB8AC3E}">
+        <p14:creationId xmlns:p14="http://schemas.microsoft.com/office/powerpoint/2010/main" val="571487126"/>
+      </p:ext>
+    </p:extLst>
+  </p:cSld>
+  <p:clrMapOvr>
+    <a:masterClrMapping/>
+  </p:clrMapOvr>
+  <p:timing>
+    <p:tnLst>
+      <p:par>
+        <p:cTn id="1" dur="indefinite" restart="never" nodeType="tmRoot">
+          <p:childTnLst>
+            <p:seq concurrent="1" nextAc="seek">
+              <p:cTn id="2" dur="indefinite" nodeType="mainSeq">
+                <p:childTnLst>
+                  <p:par>
+                    <p:cTn id="3" fill="hold">
+                      <p:stCondLst>
+                        <p:cond delay="indefinite"/>
+                      </p:stCondLst>
+                      <p:childTnLst>
+                        <p:par>
+                          <p:cTn id="4" fill="hold">
+                            <p:stCondLst>
+                              <p:cond delay="0"/>
+                            </p:stCondLst>
+                            <p:childTnLst>
+                              <p:par>
+                                <p:cTn id="5" presetID="2" presetClass="entr" presetSubtype="4" fill="hold" nodeType="clickEffect">
+                                  <p:stCondLst>
+                                    <p:cond delay="0"/>
+                                  </p:stCondLst>
+                                  <p:childTnLst>
+                                    <p:set>
+                                      <p:cBhvr>
+                                        <p:cTn id="6" dur="1" fill="hold">
+                                          <p:stCondLst>
+                                            <p:cond delay="0"/>
+                                          </p:stCondLst>
+                                        </p:cTn>
+                                        <p:tgtEl>
+                                          <p:spTgt spid="7"/>
+                                        </p:tgtEl>
+                                        <p:attrNameLst>
+                                          <p:attrName>style.visibility</p:attrName>
+                                        </p:attrNameLst>
+                                      </p:cBhvr>
+                                      <p:to>
+                                        <p:strVal val="visible"/>
+                                      </p:to>
+                                    </p:set>
+                                    <p:anim calcmode="lin" valueType="num">
+                                      <p:cBhvr additive="base">
+                                        <p:cTn id="7" dur="500" fill="hold"/>
+                                        <p:tgtEl>
+                                          <p:spTgt spid="7"/>
+                                        </p:tgtEl>
+                                        <p:attrNameLst>
+                                          <p:attrName>ppt_x</p:attrName>
+                                        </p:attrNameLst>
+                                      </p:cBhvr>
+                                      <p:tavLst>
+                                        <p:tav tm="0">
+                                          <p:val>
+                                            <p:strVal val="#ppt_x"/>
+                                          </p:val>
+                                        </p:tav>
+                                        <p:tav tm="100000">
+                                          <p:val>
+                                            <p:strVal val="#ppt_x"/>
+                                          </p:val>
+                                        </p:tav>
+                                      </p:tavLst>
+                                    </p:anim>
+                                    <p:anim calcmode="lin" valueType="num">
+                                      <p:cBhvr additive="base">
+                                        <p:cTn id="8" dur="500" fill="hold"/>
+                                        <p:tgtEl>
+                                          <p:spTgt spid="7"/>
+                                        </p:tgtEl>
+                                        <p:attrNameLst>
+                                          <p:attrName>ppt_y</p:attrName>
+                                        </p:attrNameLst>
+                                      </p:cBhvr>
+                                      <p:tavLst>
+                                        <p:tav tm="0">
+                                          <p:val>
+                                            <p:strVal val="1+#ppt_h/2"/>
+                                          </p:val>
+                                        </p:tav>
+                                        <p:tav tm="100000">
+                                          <p:val>
+                                            <p:strVal val="#ppt_y"/>
+                                          </p:val>
+                                        </p:tav>
+                                      </p:tavLst>
+                                    </p:anim>
+                                  </p:childTnLst>
+                                </p:cTn>
+                              </p:par>
+                            </p:childTnLst>
+                          </p:cTn>
+                        </p:par>
+                      </p:childTnLst>
+                    </p:cTn>
+                  </p:par>
+                </p:childTnLst>
+              </p:cTn>
+              <p:prevCondLst>
+                <p:cond evt="onPrev" delay="0">
+                  <p:tgtEl>
+                    <p:sldTgt/>
+                  </p:tgtEl>
+                </p:cond>
+              </p:prevCondLst>
+              <p:nextCondLst>
+                <p:cond evt="onNext" delay="0">
+                  <p:tgtEl>
+                    <p:sldTgt/>
+                  </p:tgtEl>
+                </p:cond>
+              </p:nextCondLst>
+            </p:seq>
+          </p:childTnLst>
+        </p:cTn>
+      </p:par>
+    </p:tnLst>
+  </p:timing>
+</p:sld>
+</file>
+
+<file path=ppt/slides/slide12.xml><?xml version="1.0" encoding="utf-8"?>
+<p:sld xmlns:a="http://schemas.openxmlformats.org/drawingml/2006/main" xmlns:r="http://schemas.openxmlformats.org/officeDocument/2006/relationships" xmlns:p="http://schemas.openxmlformats.org/presentationml/2006/main">
+  <p:cSld>
+    <p:bg>
+      <p:bgPr>
+        <a:blipFill dpi="0" rotWithShape="1">
+          <a:blip r:embed="rId2">
+            <a:alphaModFix amt="41000"/>
+            <a:lum/>
+          </a:blip>
+          <a:srcRect/>
+          <a:stretch>
+            <a:fillRect t="-9000" b="-9000"/>
+          </a:stretch>
+        </a:blipFill>
+        <a:effectLst/>
+      </p:bgPr>
+    </p:bg>
+    <p:spTree>
+      <p:nvGrpSpPr>
+        <p:cNvPr id="1" name=""/>
+        <p:cNvGrpSpPr/>
+        <p:nvPr/>
+      </p:nvGrpSpPr>
+      <p:grpSpPr>
+        <a:xfrm>
+          <a:off x="0" y="0"/>
+          <a:ext cx="0" cy="0"/>
+          <a:chOff x="0" y="0"/>
+          <a:chExt cx="0" cy="0"/>
+        </a:xfrm>
+      </p:grpSpPr>
+      <p:sp>
+        <p:nvSpPr>
+          <p:cNvPr id="2" name="Title 1">
+            <a:extLst>
+              <a:ext uri="{FF2B5EF4-FFF2-40B4-BE49-F238E27FC236}">
+                <a16:creationId xmlns:a16="http://schemas.microsoft.com/office/drawing/2014/main" id="{EB63F8CA-BCBA-4BB7-ACBB-02B3D688E55D}"/>
+              </a:ext>
+            </a:extLst>
+          </p:cNvPr>
+          <p:cNvSpPr>
+            <a:spLocks noGrp="1"/>
+          </p:cNvSpPr>
+          <p:nvPr>
+            <p:ph type="title"/>
+          </p:nvPr>
+        </p:nvSpPr>
+        <p:spPr/>
+        <p:txBody>
+          <a:bodyPr/>
+          <a:lstStyle/>
+          <a:p>
+            <a:r>
+              <a:rPr lang="en-US" b="1" dirty="0"/>
+              <a:t>With More Time</a:t>
+            </a:r>
+          </a:p>
+        </p:txBody>
+      </p:sp>
+      <p:sp>
+        <p:nvSpPr>
+          <p:cNvPr id="4" name="Content Placeholder 3">
+            <a:extLst>
+              <a:ext uri="{FF2B5EF4-FFF2-40B4-BE49-F238E27FC236}">
+                <a16:creationId xmlns:a16="http://schemas.microsoft.com/office/drawing/2014/main" id="{A15F4B6E-B72C-453F-BD8A-1E44F9F82621}"/>
+              </a:ext>
+            </a:extLst>
+          </p:cNvPr>
+          <p:cNvSpPr>
+            <a:spLocks noGrp="1"/>
+          </p:cNvSpPr>
+          <p:nvPr>
+            <p:ph idx="1"/>
+          </p:nvPr>
+        </p:nvSpPr>
+        <p:spPr/>
+        <p:txBody>
+          <a:bodyPr/>
+          <a:lstStyle/>
+          <a:p>
+            <a:r>
+              <a:rPr lang="en-US" dirty="0"/>
+              <a:t>Would create a model that could project for each indicator. </a:t>
+            </a:r>
+          </a:p>
+          <a:p>
+            <a:endParaRPr lang="en-US" dirty="0"/>
+          </a:p>
+          <a:p>
+            <a:endParaRPr lang="en-US" dirty="0"/>
+          </a:p>
+          <a:p>
+            <a:endParaRPr lang="en-US" dirty="0"/>
+          </a:p>
+          <a:p>
+            <a:endParaRPr lang="en-US" dirty="0"/>
+          </a:p>
+          <a:p>
+            <a:pPr marL="0" indent="0">
+              <a:buNone/>
+            </a:pPr>
+            <a:endParaRPr lang="en-US" dirty="0"/>
+          </a:p>
+          <a:p>
+            <a:r>
+              <a:rPr lang="en-US" dirty="0"/>
+              <a:t>Review each indicator’s relation to recession.</a:t>
+            </a:r>
+          </a:p>
+        </p:txBody>
+      </p:sp>
+      <p:pic>
+        <p:nvPicPr>
+          <p:cNvPr id="5" name="Picture 4">
+            <a:extLst>
+              <a:ext uri="{FF2B5EF4-FFF2-40B4-BE49-F238E27FC236}">
+                <a16:creationId xmlns:a16="http://schemas.microsoft.com/office/drawing/2014/main" id="{F89A295F-6F00-4309-8583-2E23BF4A5FB8}"/>
+              </a:ext>
+            </a:extLst>
+          </p:cNvPr>
+          <p:cNvPicPr>
+            <a:picLocks noChangeAspect="1"/>
+          </p:cNvPicPr>
+          <p:nvPr/>
+        </p:nvPicPr>
+        <p:blipFill>
+          <a:blip r:embed="rId3">
+            <a:extLst>
+              <a:ext uri="{28A0092B-C50C-407E-A947-70E740481C1C}">
+                <a14:useLocalDpi xmlns:a14="http://schemas.microsoft.com/office/drawing/2010/main" val="0"/>
+              </a:ext>
+            </a:extLst>
+          </a:blip>
+          <a:stretch>
+            <a:fillRect/>
+          </a:stretch>
+        </p:blipFill>
+        <p:spPr>
+          <a:xfrm>
+            <a:off x="2069215" y="2200275"/>
+            <a:ext cx="4026786" cy="2590800"/>
+          </a:xfrm>
+          <a:prstGeom prst="rect">
+            <a:avLst/>
+          </a:prstGeom>
+        </p:spPr>
+      </p:pic>
+      <p:pic>
+        <p:nvPicPr>
+          <p:cNvPr id="7" name="Picture 6">
+            <a:extLst>
+              <a:ext uri="{FF2B5EF4-FFF2-40B4-BE49-F238E27FC236}">
+                <a16:creationId xmlns:a16="http://schemas.microsoft.com/office/drawing/2014/main" id="{8804DD41-F098-4D93-A308-0CC7805C8097}"/>
+              </a:ext>
+            </a:extLst>
+          </p:cNvPr>
+          <p:cNvPicPr>
+            <a:picLocks noChangeAspect="1"/>
+          </p:cNvPicPr>
+          <p:nvPr/>
+        </p:nvPicPr>
+        <p:blipFill>
+          <a:blip r:embed="rId4">
+            <a:extLst>
+              <a:ext uri="{28A0092B-C50C-407E-A947-70E740481C1C}">
+                <a14:useLocalDpi xmlns:a14="http://schemas.microsoft.com/office/drawing/2010/main" val="0"/>
+              </a:ext>
+            </a:extLst>
+          </a:blip>
+          <a:stretch>
+            <a:fillRect/>
+          </a:stretch>
+        </p:blipFill>
+        <p:spPr>
+          <a:xfrm>
+            <a:off x="6096000" y="2200275"/>
+            <a:ext cx="4457700" cy="2590800"/>
+          </a:xfrm>
+          <a:prstGeom prst="rect">
+            <a:avLst/>
+          </a:prstGeom>
+        </p:spPr>
+      </p:pic>
+    </p:spTree>
+    <p:extLst>
+      <p:ext uri="{BB962C8B-B14F-4D97-AF65-F5344CB8AC3E}">
+        <p14:creationId xmlns:p14="http://schemas.microsoft.com/office/powerpoint/2010/main" val="262056734"/>
+      </p:ext>
+    </p:extLst>
+  </p:cSld>
+  <p:clrMapOvr>
+    <a:masterClrMapping/>
+  </p:clrMapOvr>
+  <p:timing>
+    <p:tnLst>
+      <p:par>
+        <p:cTn id="1" dur="indefinite" restart="never" nodeType="tmRoot">
+          <p:childTnLst>
+            <p:seq concurrent="1" nextAc="seek">
+              <p:cTn id="2" dur="indefinite" nodeType="mainSeq">
+                <p:childTnLst>
+                  <p:par>
+                    <p:cTn id="3" fill="hold">
+                      <p:stCondLst>
+                        <p:cond delay="indefinite"/>
+                      </p:stCondLst>
+                      <p:childTnLst>
+                        <p:par>
+                          <p:cTn id="4" fill="hold">
+                            <p:stCondLst>
+                              <p:cond delay="0"/>
+                            </p:stCondLst>
+                            <p:childTnLst>
+                              <p:par>
+                                <p:cTn id="5" presetID="2" presetClass="entr" presetSubtype="4" fill="hold" grpId="0" nodeType="clickEffect">
+                                  <p:stCondLst>
+                                    <p:cond delay="0"/>
+                                  </p:stCondLst>
+                                  <p:childTnLst>
+                                    <p:set>
+                                      <p:cBhvr>
+                                        <p:cTn id="6" dur="1" fill="hold">
+                                          <p:stCondLst>
+                                            <p:cond delay="0"/>
+                                          </p:stCondLst>
+                                        </p:cTn>
+                                        <p:tgtEl>
+                                          <p:spTgt spid="4">
+                                            <p:txEl>
+                                              <p:pRg st="0" end="0"/>
+                                            </p:txEl>
+                                          </p:spTgt>
+                                        </p:tgtEl>
+                                        <p:attrNameLst>
+                                          <p:attrName>style.visibility</p:attrName>
+                                        </p:attrNameLst>
+                                      </p:cBhvr>
+                                      <p:to>
+                                        <p:strVal val="visible"/>
+                                      </p:to>
+                                    </p:set>
+                                    <p:anim calcmode="lin" valueType="num">
+                                      <p:cBhvr additive="base">
+                                        <p:cTn id="7" dur="500" fill="hold"/>
+                                        <p:tgtEl>
+                                          <p:spTgt spid="4">
+                                            <p:txEl>
+                                              <p:pRg st="0" end="0"/>
+                                            </p:txEl>
+                                          </p:spTgt>
+                                        </p:tgtEl>
+                                        <p:attrNameLst>
+                                          <p:attrName>ppt_x</p:attrName>
+                                        </p:attrNameLst>
+                                      </p:cBhvr>
+                                      <p:tavLst>
+                                        <p:tav tm="0">
+                                          <p:val>
+                                            <p:strVal val="#ppt_x"/>
+                                          </p:val>
+                                        </p:tav>
+                                        <p:tav tm="100000">
+                                          <p:val>
+                                            <p:strVal val="#ppt_x"/>
+                                          </p:val>
+                                        </p:tav>
+                                      </p:tavLst>
+                                    </p:anim>
+                                    <p:anim calcmode="lin" valueType="num">
+                                      <p:cBhvr additive="base">
+                                        <p:cTn id="8" dur="500" fill="hold"/>
+                                        <p:tgtEl>
+                                          <p:spTgt spid="4">
+                                            <p:txEl>
+                                              <p:pRg st="0" end="0"/>
+                                            </p:txEl>
+                                          </p:spTgt>
+                                        </p:tgtEl>
+                                        <p:attrNameLst>
+                                          <p:attrName>ppt_y</p:attrName>
+                                        </p:attrNameLst>
+                                      </p:cBhvr>
+                                      <p:tavLst>
+                                        <p:tav tm="0">
+                                          <p:val>
+                                            <p:strVal val="1+#ppt_h/2"/>
+                                          </p:val>
+                                        </p:tav>
+                                        <p:tav tm="100000">
+                                          <p:val>
+                                            <p:strVal val="#ppt_y"/>
+                                          </p:val>
+                                        </p:tav>
+                                      </p:tavLst>
+                                    </p:anim>
+                                  </p:childTnLst>
+                                </p:cTn>
+                              </p:par>
+                            </p:childTnLst>
+                          </p:cTn>
+                        </p:par>
+                      </p:childTnLst>
+                    </p:cTn>
+                  </p:par>
+                  <p:par>
+                    <p:cTn id="9" fill="hold">
+                      <p:stCondLst>
+                        <p:cond delay="indefinite"/>
+                      </p:stCondLst>
+                      <p:childTnLst>
+                        <p:par>
+                          <p:cTn id="10" fill="hold">
+                            <p:stCondLst>
+                              <p:cond delay="0"/>
+                            </p:stCondLst>
+                            <p:childTnLst>
+                              <p:par>
+                                <p:cTn id="11" presetID="2" presetClass="entr" presetSubtype="4" fill="hold" grpId="0" nodeType="clickEffect">
+                                  <p:stCondLst>
+                                    <p:cond delay="0"/>
+                                  </p:stCondLst>
+                                  <p:childTnLst>
+                                    <p:set>
+                                      <p:cBhvr>
+                                        <p:cTn id="12" dur="1" fill="hold">
+                                          <p:stCondLst>
+                                            <p:cond delay="0"/>
+                                          </p:stCondLst>
+                                        </p:cTn>
+                                        <p:tgtEl>
+                                          <p:spTgt spid="4">
+                                            <p:txEl>
+                                              <p:pRg st="6" end="6"/>
+                                            </p:txEl>
+                                          </p:spTgt>
+                                        </p:tgtEl>
+                                        <p:attrNameLst>
+                                          <p:attrName>style.visibility</p:attrName>
+                                        </p:attrNameLst>
+                                      </p:cBhvr>
+                                      <p:to>
+                                        <p:strVal val="visible"/>
+                                      </p:to>
+                                    </p:set>
+                                    <p:anim calcmode="lin" valueType="num">
+                                      <p:cBhvr additive="base">
+                                        <p:cTn id="13" dur="500" fill="hold"/>
+                                        <p:tgtEl>
+                                          <p:spTgt spid="4">
+                                            <p:txEl>
+                                              <p:pRg st="6" end="6"/>
+                                            </p:txEl>
+                                          </p:spTgt>
+                                        </p:tgtEl>
+                                        <p:attrNameLst>
+                                          <p:attrName>ppt_x</p:attrName>
+                                        </p:attrNameLst>
+                                      </p:cBhvr>
+                                      <p:tavLst>
+                                        <p:tav tm="0">
+                                          <p:val>
+                                            <p:strVal val="#ppt_x"/>
+                                          </p:val>
+                                        </p:tav>
+                                        <p:tav tm="100000">
+                                          <p:val>
+                                            <p:strVal val="#ppt_x"/>
+                                          </p:val>
+                                        </p:tav>
+                                      </p:tavLst>
+                                    </p:anim>
+                                    <p:anim calcmode="lin" valueType="num">
+                                      <p:cBhvr additive="base">
+                                        <p:cTn id="14" dur="500" fill="hold"/>
+                                        <p:tgtEl>
+                                          <p:spTgt spid="4">
+                                            <p:txEl>
+                                              <p:pRg st="6" end="6"/>
+                                            </p:txEl>
+                                          </p:spTgt>
+                                        </p:tgtEl>
+                                        <p:attrNameLst>
+                                          <p:attrName>ppt_y</p:attrName>
+                                        </p:attrNameLst>
+                                      </p:cBhvr>
+                                      <p:tavLst>
+                                        <p:tav tm="0">
+                                          <p:val>
+                                            <p:strVal val="1+#ppt_h/2"/>
+                                          </p:val>
+                                        </p:tav>
+                                        <p:tav tm="100000">
+                                          <p:val>
+                                            <p:strVal val="#ppt_y"/>
+                                          </p:val>
+                                        </p:tav>
+                                      </p:tavLst>
+                                    </p:anim>
+                                  </p:childTnLst>
+                                </p:cTn>
+                              </p:par>
+                            </p:childTnLst>
+                          </p:cTn>
+                        </p:par>
+                      </p:childTnLst>
+                    </p:cTn>
+                  </p:par>
+                </p:childTnLst>
+              </p:cTn>
+              <p:prevCondLst>
+                <p:cond evt="onPrev" delay="0">
+                  <p:tgtEl>
+                    <p:sldTgt/>
+                  </p:tgtEl>
+                </p:cond>
+              </p:prevCondLst>
+              <p:nextCondLst>
+                <p:cond evt="onNext" delay="0">
+                  <p:tgtEl>
+                    <p:sldTgt/>
+                  </p:tgtEl>
+                </p:cond>
+              </p:nextCondLst>
+            </p:seq>
+          </p:childTnLst>
+        </p:cTn>
+      </p:par>
+    </p:tnLst>
+    <p:bldLst>
+      <p:bldP spid="4" grpId="0" build="p"/>
+    </p:bldLst>
+  </p:timing>
+</p:sld>
+</file>
+
 <file path=ppt/slides/slide2.xml><?xml version="1.0" encoding="utf-8"?>
 <p:sld xmlns:a="http://schemas.openxmlformats.org/drawingml/2006/main" xmlns:r="http://schemas.openxmlformats.org/officeDocument/2006/relationships" xmlns:p="http://schemas.openxmlformats.org/presentationml/2006/main">
   <p:cSld>
@@ -5585,6 +6619,42 @@
           </a:p>
         </p:txBody>
       </p:sp>
+      <p:pic>
+        <p:nvPicPr>
+          <p:cNvPr id="5" name="Picture 4">
+            <a:extLst>
+              <a:ext uri="{FF2B5EF4-FFF2-40B4-BE49-F238E27FC236}">
+                <a16:creationId xmlns:a16="http://schemas.microsoft.com/office/drawing/2014/main" id="{F0FD3018-9A08-424E-8367-483B47015BBF}"/>
+              </a:ext>
+            </a:extLst>
+          </p:cNvPr>
+          <p:cNvPicPr>
+            <a:picLocks noChangeAspect="1"/>
+          </p:cNvPicPr>
+          <p:nvPr/>
+        </p:nvPicPr>
+        <p:blipFill>
+          <a:blip r:embed="rId3">
+            <a:extLst>
+              <a:ext uri="{28A0092B-C50C-407E-A947-70E740481C1C}">
+                <a14:useLocalDpi xmlns:a14="http://schemas.microsoft.com/office/drawing/2010/main" val="0"/>
+              </a:ext>
+            </a:extLst>
+          </a:blip>
+          <a:stretch>
+            <a:fillRect/>
+          </a:stretch>
+        </p:blipFill>
+        <p:spPr>
+          <a:xfrm>
+            <a:off x="0" y="3429000"/>
+            <a:ext cx="12192000" cy="3429000"/>
+          </a:xfrm>
+          <a:prstGeom prst="rect">
+            <a:avLst/>
+          </a:prstGeom>
+        </p:spPr>
+      </p:pic>
     </p:spTree>
     <p:extLst>
       <p:ext uri="{BB962C8B-B14F-4D97-AF65-F5344CB8AC3E}">
@@ -5815,6 +6885,2714 @@
                                         <p:tav tm="0">
                                           <p:val>
                                             <p:strVal val="#ppt_y+.1"/>
+                                          </p:val>
+                                        </p:tav>
+                                        <p:tav tm="100000">
+                                          <p:val>
+                                            <p:strVal val="#ppt_y"/>
+                                          </p:val>
+                                        </p:tav>
+                                      </p:tavLst>
+                                    </p:anim>
+                                  </p:childTnLst>
+                                </p:cTn>
+                              </p:par>
+                            </p:childTnLst>
+                          </p:cTn>
+                        </p:par>
+                      </p:childTnLst>
+                    </p:cTn>
+                  </p:par>
+                  <p:par>
+                    <p:cTn id="17" fill="hold">
+                      <p:stCondLst>
+                        <p:cond delay="indefinite"/>
+                      </p:stCondLst>
+                      <p:childTnLst>
+                        <p:par>
+                          <p:cTn id="18" fill="hold">
+                            <p:stCondLst>
+                              <p:cond delay="0"/>
+                            </p:stCondLst>
+                            <p:childTnLst>
+                              <p:par>
+                                <p:cTn id="19" presetID="2" presetClass="entr" presetSubtype="4" fill="hold" nodeType="clickEffect">
+                                  <p:stCondLst>
+                                    <p:cond delay="0"/>
+                                  </p:stCondLst>
+                                  <p:childTnLst>
+                                    <p:set>
+                                      <p:cBhvr>
+                                        <p:cTn id="20" dur="1" fill="hold">
+                                          <p:stCondLst>
+                                            <p:cond delay="0"/>
+                                          </p:stCondLst>
+                                        </p:cTn>
+                                        <p:tgtEl>
+                                          <p:spTgt spid="5"/>
+                                        </p:tgtEl>
+                                        <p:attrNameLst>
+                                          <p:attrName>style.visibility</p:attrName>
+                                        </p:attrNameLst>
+                                      </p:cBhvr>
+                                      <p:to>
+                                        <p:strVal val="visible"/>
+                                      </p:to>
+                                    </p:set>
+                                    <p:anim calcmode="lin" valueType="num">
+                                      <p:cBhvr additive="base">
+                                        <p:cTn id="21" dur="500" fill="hold"/>
+                                        <p:tgtEl>
+                                          <p:spTgt spid="5"/>
+                                        </p:tgtEl>
+                                        <p:attrNameLst>
+                                          <p:attrName>ppt_x</p:attrName>
+                                        </p:attrNameLst>
+                                      </p:cBhvr>
+                                      <p:tavLst>
+                                        <p:tav tm="0">
+                                          <p:val>
+                                            <p:strVal val="#ppt_x"/>
+                                          </p:val>
+                                        </p:tav>
+                                        <p:tav tm="100000">
+                                          <p:val>
+                                            <p:strVal val="#ppt_x"/>
+                                          </p:val>
+                                        </p:tav>
+                                      </p:tavLst>
+                                    </p:anim>
+                                    <p:anim calcmode="lin" valueType="num">
+                                      <p:cBhvr additive="base">
+                                        <p:cTn id="22" dur="500" fill="hold"/>
+                                        <p:tgtEl>
+                                          <p:spTgt spid="5"/>
+                                        </p:tgtEl>
+                                        <p:attrNameLst>
+                                          <p:attrName>ppt_y</p:attrName>
+                                        </p:attrNameLst>
+                                      </p:cBhvr>
+                                      <p:tavLst>
+                                        <p:tav tm="0">
+                                          <p:val>
+                                            <p:strVal val="1+#ppt_h/2"/>
+                                          </p:val>
+                                        </p:tav>
+                                        <p:tav tm="100000">
+                                          <p:val>
+                                            <p:strVal val="#ppt_y"/>
+                                          </p:val>
+                                        </p:tav>
+                                      </p:tavLst>
+                                    </p:anim>
+                                  </p:childTnLst>
+                                </p:cTn>
+                              </p:par>
+                            </p:childTnLst>
+                          </p:cTn>
+                        </p:par>
+                      </p:childTnLst>
+                    </p:cTn>
+                  </p:par>
+                </p:childTnLst>
+              </p:cTn>
+              <p:prevCondLst>
+                <p:cond evt="onPrev" delay="0">
+                  <p:tgtEl>
+                    <p:sldTgt/>
+                  </p:tgtEl>
+                </p:cond>
+              </p:prevCondLst>
+              <p:nextCondLst>
+                <p:cond evt="onNext" delay="0">
+                  <p:tgtEl>
+                    <p:sldTgt/>
+                  </p:tgtEl>
+                </p:cond>
+              </p:nextCondLst>
+            </p:seq>
+          </p:childTnLst>
+        </p:cTn>
+      </p:par>
+    </p:tnLst>
+  </p:timing>
+</p:sld>
+</file>
+
+<file path=ppt/slides/slide5.xml><?xml version="1.0" encoding="utf-8"?>
+<p:sld xmlns:a="http://schemas.openxmlformats.org/drawingml/2006/main" xmlns:r="http://schemas.openxmlformats.org/officeDocument/2006/relationships" xmlns:p="http://schemas.openxmlformats.org/presentationml/2006/main">
+  <p:cSld>
+    <p:bg>
+      <p:bgPr>
+        <a:blipFill dpi="0" rotWithShape="1">
+          <a:blip r:embed="rId2">
+            <a:alphaModFix amt="41000"/>
+            <a:lum/>
+          </a:blip>
+          <a:srcRect/>
+          <a:stretch>
+            <a:fillRect t="-9000" b="-9000"/>
+          </a:stretch>
+        </a:blipFill>
+        <a:effectLst/>
+      </p:bgPr>
+    </p:bg>
+    <p:spTree>
+      <p:nvGrpSpPr>
+        <p:cNvPr id="1" name=""/>
+        <p:cNvGrpSpPr/>
+        <p:nvPr/>
+      </p:nvGrpSpPr>
+      <p:grpSpPr>
+        <a:xfrm>
+          <a:off x="0" y="0"/>
+          <a:ext cx="0" cy="0"/>
+          <a:chOff x="0" y="0"/>
+          <a:chExt cx="0" cy="0"/>
+        </a:xfrm>
+      </p:grpSpPr>
+      <p:sp>
+        <p:nvSpPr>
+          <p:cNvPr id="2" name="Title 1">
+            <a:extLst>
+              <a:ext uri="{FF2B5EF4-FFF2-40B4-BE49-F238E27FC236}">
+                <a16:creationId xmlns:a16="http://schemas.microsoft.com/office/drawing/2014/main" id="{EB63F8CA-BCBA-4BB7-ACBB-02B3D688E55D}"/>
+              </a:ext>
+            </a:extLst>
+          </p:cNvPr>
+          <p:cNvSpPr>
+            <a:spLocks noGrp="1"/>
+          </p:cNvSpPr>
+          <p:nvPr>
+            <p:ph type="title"/>
+          </p:nvPr>
+        </p:nvSpPr>
+        <p:spPr>
+          <a:xfrm>
+            <a:off x="838198" y="0"/>
+            <a:ext cx="10515600" cy="1325563"/>
+          </a:xfrm>
+        </p:spPr>
+        <p:txBody>
+          <a:bodyPr/>
+          <a:lstStyle/>
+          <a:p>
+            <a:r>
+              <a:rPr lang="en-US" b="1" dirty="0"/>
+              <a:t>Consistent Indicators</a:t>
+            </a:r>
+            <a:br>
+              <a:rPr lang="en-US" b="1" dirty="0"/>
+            </a:br>
+            <a:endParaRPr lang="en-US" b="1" dirty="0"/>
+          </a:p>
+        </p:txBody>
+      </p:sp>
+      <p:pic>
+        <p:nvPicPr>
+          <p:cNvPr id="6" name="Content Placeholder 5">
+            <a:extLst>
+              <a:ext uri="{FF2B5EF4-FFF2-40B4-BE49-F238E27FC236}">
+                <a16:creationId xmlns:a16="http://schemas.microsoft.com/office/drawing/2014/main" id="{C68A2BFB-7BC1-4347-9815-5E8CA878865C}"/>
+              </a:ext>
+            </a:extLst>
+          </p:cNvPr>
+          <p:cNvPicPr>
+            <a:picLocks noGrp="1" noChangeAspect="1"/>
+          </p:cNvPicPr>
+          <p:nvPr>
+            <p:ph idx="1"/>
+          </p:nvPr>
+        </p:nvPicPr>
+        <p:blipFill>
+          <a:blip r:embed="rId3">
+            <a:extLst>
+              <a:ext uri="{28A0092B-C50C-407E-A947-70E740481C1C}">
+                <a14:useLocalDpi xmlns:a14="http://schemas.microsoft.com/office/drawing/2010/main" val="0"/>
+              </a:ext>
+            </a:extLst>
+          </a:blip>
+          <a:stretch>
+            <a:fillRect/>
+          </a:stretch>
+        </p:blipFill>
+        <p:spPr>
+          <a:xfrm>
+            <a:off x="1475361" y="723469"/>
+            <a:ext cx="9241272" cy="3080423"/>
+          </a:xfrm>
+        </p:spPr>
+      </p:pic>
+      <p:pic>
+        <p:nvPicPr>
+          <p:cNvPr id="8" name="Picture 7">
+            <a:extLst>
+              <a:ext uri="{FF2B5EF4-FFF2-40B4-BE49-F238E27FC236}">
+                <a16:creationId xmlns:a16="http://schemas.microsoft.com/office/drawing/2014/main" id="{938758A7-4BA7-4B7F-8474-981D9C6FF27A}"/>
+              </a:ext>
+            </a:extLst>
+          </p:cNvPr>
+          <p:cNvPicPr>
+            <a:picLocks noChangeAspect="1"/>
+          </p:cNvPicPr>
+          <p:nvPr/>
+        </p:nvPicPr>
+        <p:blipFill>
+          <a:blip r:embed="rId4">
+            <a:extLst>
+              <a:ext uri="{28A0092B-C50C-407E-A947-70E740481C1C}">
+                <a14:useLocalDpi xmlns:a14="http://schemas.microsoft.com/office/drawing/2010/main" val="0"/>
+              </a:ext>
+            </a:extLst>
+          </a:blip>
+          <a:stretch>
+            <a:fillRect/>
+          </a:stretch>
+        </p:blipFill>
+        <p:spPr>
+          <a:xfrm>
+            <a:off x="1475361" y="3803892"/>
+            <a:ext cx="9241272" cy="3080423"/>
+          </a:xfrm>
+          <a:prstGeom prst="rect">
+            <a:avLst/>
+          </a:prstGeom>
+        </p:spPr>
+      </p:pic>
+    </p:spTree>
+    <p:extLst>
+      <p:ext uri="{BB962C8B-B14F-4D97-AF65-F5344CB8AC3E}">
+        <p14:creationId xmlns:p14="http://schemas.microsoft.com/office/powerpoint/2010/main" val="2844984601"/>
+      </p:ext>
+    </p:extLst>
+  </p:cSld>
+  <p:clrMapOvr>
+    <a:masterClrMapping/>
+  </p:clrMapOvr>
+  <p:timing>
+    <p:tnLst>
+      <p:par>
+        <p:cTn id="1" dur="indefinite" restart="never" nodeType="tmRoot">
+          <p:childTnLst>
+            <p:seq concurrent="1" nextAc="seek">
+              <p:cTn id="2" dur="indefinite" nodeType="mainSeq">
+                <p:childTnLst>
+                  <p:par>
+                    <p:cTn id="3" fill="hold">
+                      <p:stCondLst>
+                        <p:cond delay="indefinite"/>
+                      </p:stCondLst>
+                      <p:childTnLst>
+                        <p:par>
+                          <p:cTn id="4" fill="hold">
+                            <p:stCondLst>
+                              <p:cond delay="0"/>
+                            </p:stCondLst>
+                            <p:childTnLst>
+                              <p:par>
+                                <p:cTn id="5" presetID="1" presetClass="entr" presetSubtype="0" fill="hold" nodeType="clickEffect">
+                                  <p:stCondLst>
+                                    <p:cond delay="0"/>
+                                  </p:stCondLst>
+                                  <p:childTnLst>
+                                    <p:set>
+                                      <p:cBhvr>
+                                        <p:cTn id="6" dur="1" fill="hold">
+                                          <p:stCondLst>
+                                            <p:cond delay="0"/>
+                                          </p:stCondLst>
+                                        </p:cTn>
+                                        <p:tgtEl>
+                                          <p:spTgt spid="6"/>
+                                        </p:tgtEl>
+                                        <p:attrNameLst>
+                                          <p:attrName>style.visibility</p:attrName>
+                                        </p:attrNameLst>
+                                      </p:cBhvr>
+                                      <p:to>
+                                        <p:strVal val="visible"/>
+                                      </p:to>
+                                    </p:set>
+                                  </p:childTnLst>
+                                </p:cTn>
+                              </p:par>
+                            </p:childTnLst>
+                          </p:cTn>
+                        </p:par>
+                      </p:childTnLst>
+                    </p:cTn>
+                  </p:par>
+                  <p:par>
+                    <p:cTn id="7" fill="hold">
+                      <p:stCondLst>
+                        <p:cond delay="indefinite"/>
+                      </p:stCondLst>
+                      <p:childTnLst>
+                        <p:par>
+                          <p:cTn id="8" fill="hold">
+                            <p:stCondLst>
+                              <p:cond delay="0"/>
+                            </p:stCondLst>
+                            <p:childTnLst>
+                              <p:par>
+                                <p:cTn id="9" presetID="1" presetClass="entr" presetSubtype="0" fill="hold" nodeType="clickEffect">
+                                  <p:stCondLst>
+                                    <p:cond delay="0"/>
+                                  </p:stCondLst>
+                                  <p:childTnLst>
+                                    <p:set>
+                                      <p:cBhvr>
+                                        <p:cTn id="10" dur="1" fill="hold">
+                                          <p:stCondLst>
+                                            <p:cond delay="0"/>
+                                          </p:stCondLst>
+                                        </p:cTn>
+                                        <p:tgtEl>
+                                          <p:spTgt spid="8"/>
+                                        </p:tgtEl>
+                                        <p:attrNameLst>
+                                          <p:attrName>style.visibility</p:attrName>
+                                        </p:attrNameLst>
+                                      </p:cBhvr>
+                                      <p:to>
+                                        <p:strVal val="visible"/>
+                                      </p:to>
+                                    </p:set>
+                                  </p:childTnLst>
+                                </p:cTn>
+                              </p:par>
+                            </p:childTnLst>
+                          </p:cTn>
+                        </p:par>
+                      </p:childTnLst>
+                    </p:cTn>
+                  </p:par>
+                </p:childTnLst>
+              </p:cTn>
+              <p:prevCondLst>
+                <p:cond evt="onPrev" delay="0">
+                  <p:tgtEl>
+                    <p:sldTgt/>
+                  </p:tgtEl>
+                </p:cond>
+              </p:prevCondLst>
+              <p:nextCondLst>
+                <p:cond evt="onNext" delay="0">
+                  <p:tgtEl>
+                    <p:sldTgt/>
+                  </p:tgtEl>
+                </p:cond>
+              </p:nextCondLst>
+            </p:seq>
+          </p:childTnLst>
+        </p:cTn>
+      </p:par>
+    </p:tnLst>
+  </p:timing>
+</p:sld>
+</file>
+
+<file path=ppt/slides/slide6.xml><?xml version="1.0" encoding="utf-8"?>
+<p:sld xmlns:a="http://schemas.openxmlformats.org/drawingml/2006/main" xmlns:r="http://schemas.openxmlformats.org/officeDocument/2006/relationships" xmlns:p="http://schemas.openxmlformats.org/presentationml/2006/main">
+  <p:cSld>
+    <p:bg>
+      <p:bgPr>
+        <a:blipFill dpi="0" rotWithShape="1">
+          <a:blip r:embed="rId2">
+            <a:alphaModFix amt="41000"/>
+            <a:lum/>
+          </a:blip>
+          <a:srcRect/>
+          <a:stretch>
+            <a:fillRect t="-9000" b="-9000"/>
+          </a:stretch>
+        </a:blipFill>
+        <a:effectLst/>
+      </p:bgPr>
+    </p:bg>
+    <p:spTree>
+      <p:nvGrpSpPr>
+        <p:cNvPr id="1" name=""/>
+        <p:cNvGrpSpPr/>
+        <p:nvPr/>
+      </p:nvGrpSpPr>
+      <p:grpSpPr>
+        <a:xfrm>
+          <a:off x="0" y="0"/>
+          <a:ext cx="0" cy="0"/>
+          <a:chOff x="0" y="0"/>
+          <a:chExt cx="0" cy="0"/>
+        </a:xfrm>
+      </p:grpSpPr>
+      <p:sp>
+        <p:nvSpPr>
+          <p:cNvPr id="2" name="Title 1">
+            <a:extLst>
+              <a:ext uri="{FF2B5EF4-FFF2-40B4-BE49-F238E27FC236}">
+                <a16:creationId xmlns:a16="http://schemas.microsoft.com/office/drawing/2014/main" id="{EB63F8CA-BCBA-4BB7-ACBB-02B3D688E55D}"/>
+              </a:ext>
+            </a:extLst>
+          </p:cNvPr>
+          <p:cNvSpPr>
+            <a:spLocks noGrp="1"/>
+          </p:cNvSpPr>
+          <p:nvPr>
+            <p:ph type="title"/>
+          </p:nvPr>
+        </p:nvSpPr>
+        <p:spPr>
+          <a:xfrm>
+            <a:off x="838198" y="0"/>
+            <a:ext cx="10515600" cy="1325563"/>
+          </a:xfrm>
+        </p:spPr>
+        <p:txBody>
+          <a:bodyPr/>
+          <a:lstStyle/>
+          <a:p>
+            <a:r>
+              <a:rPr lang="en-US" b="1" dirty="0"/>
+              <a:t>Inconsistent Indicators</a:t>
+            </a:r>
+            <a:br>
+              <a:rPr lang="en-US" b="1" dirty="0"/>
+            </a:br>
+            <a:endParaRPr lang="en-US" b="1" dirty="0"/>
+          </a:p>
+        </p:txBody>
+      </p:sp>
+      <p:pic>
+        <p:nvPicPr>
+          <p:cNvPr id="7" name="Content Placeholder 6">
+            <a:extLst>
+              <a:ext uri="{FF2B5EF4-FFF2-40B4-BE49-F238E27FC236}">
+                <a16:creationId xmlns:a16="http://schemas.microsoft.com/office/drawing/2014/main" id="{3A44B619-7A19-4165-A1FC-2C9FD381DBE5}"/>
+              </a:ext>
+            </a:extLst>
+          </p:cNvPr>
+          <p:cNvPicPr>
+            <a:picLocks noGrp="1" noChangeAspect="1"/>
+          </p:cNvPicPr>
+          <p:nvPr>
+            <p:ph idx="1"/>
+          </p:nvPr>
+        </p:nvPicPr>
+        <p:blipFill>
+          <a:blip r:embed="rId3">
+            <a:extLst>
+              <a:ext uri="{28A0092B-C50C-407E-A947-70E740481C1C}">
+                <a14:useLocalDpi xmlns:a14="http://schemas.microsoft.com/office/drawing/2010/main" val="0"/>
+              </a:ext>
+            </a:extLst>
+          </a:blip>
+          <a:stretch>
+            <a:fillRect/>
+          </a:stretch>
+        </p:blipFill>
+        <p:spPr>
+          <a:xfrm>
+            <a:off x="1434608" y="635000"/>
+            <a:ext cx="9322784" cy="3107595"/>
+          </a:xfrm>
+        </p:spPr>
+      </p:pic>
+      <p:pic>
+        <p:nvPicPr>
+          <p:cNvPr id="10" name="Picture 9">
+            <a:extLst>
+              <a:ext uri="{FF2B5EF4-FFF2-40B4-BE49-F238E27FC236}">
+                <a16:creationId xmlns:a16="http://schemas.microsoft.com/office/drawing/2014/main" id="{97B6DC96-9731-4EEA-8E0A-27628CBE568F}"/>
+              </a:ext>
+            </a:extLst>
+          </p:cNvPr>
+          <p:cNvPicPr>
+            <a:picLocks noChangeAspect="1"/>
+          </p:cNvPicPr>
+          <p:nvPr/>
+        </p:nvPicPr>
+        <p:blipFill>
+          <a:blip r:embed="rId4">
+            <a:extLst>
+              <a:ext uri="{28A0092B-C50C-407E-A947-70E740481C1C}">
+                <a14:useLocalDpi xmlns:a14="http://schemas.microsoft.com/office/drawing/2010/main" val="0"/>
+              </a:ext>
+            </a:extLst>
+          </a:blip>
+          <a:stretch>
+            <a:fillRect/>
+          </a:stretch>
+        </p:blipFill>
+        <p:spPr>
+          <a:xfrm>
+            <a:off x="1434611" y="3750406"/>
+            <a:ext cx="9322781" cy="3107594"/>
+          </a:xfrm>
+          <a:prstGeom prst="rect">
+            <a:avLst/>
+          </a:prstGeom>
+        </p:spPr>
+      </p:pic>
+    </p:spTree>
+    <p:extLst>
+      <p:ext uri="{BB962C8B-B14F-4D97-AF65-F5344CB8AC3E}">
+        <p14:creationId xmlns:p14="http://schemas.microsoft.com/office/powerpoint/2010/main" val="671651168"/>
+      </p:ext>
+    </p:extLst>
+  </p:cSld>
+  <p:clrMapOvr>
+    <a:masterClrMapping/>
+  </p:clrMapOvr>
+  <p:timing>
+    <p:tnLst>
+      <p:par>
+        <p:cTn id="1" dur="indefinite" restart="never" nodeType="tmRoot">
+          <p:childTnLst>
+            <p:seq concurrent="1" nextAc="seek">
+              <p:cTn id="2" dur="indefinite" nodeType="mainSeq">
+                <p:childTnLst>
+                  <p:par>
+                    <p:cTn id="3" fill="hold">
+                      <p:stCondLst>
+                        <p:cond delay="indefinite"/>
+                      </p:stCondLst>
+                      <p:childTnLst>
+                        <p:par>
+                          <p:cTn id="4" fill="hold">
+                            <p:stCondLst>
+                              <p:cond delay="0"/>
+                            </p:stCondLst>
+                            <p:childTnLst>
+                              <p:par>
+                                <p:cTn id="5" presetID="1" presetClass="entr" presetSubtype="0" fill="hold" nodeType="clickEffect">
+                                  <p:stCondLst>
+                                    <p:cond delay="0"/>
+                                  </p:stCondLst>
+                                  <p:childTnLst>
+                                    <p:set>
+                                      <p:cBhvr>
+                                        <p:cTn id="6" dur="1" fill="hold">
+                                          <p:stCondLst>
+                                            <p:cond delay="0"/>
+                                          </p:stCondLst>
+                                        </p:cTn>
+                                        <p:tgtEl>
+                                          <p:spTgt spid="7"/>
+                                        </p:tgtEl>
+                                        <p:attrNameLst>
+                                          <p:attrName>style.visibility</p:attrName>
+                                        </p:attrNameLst>
+                                      </p:cBhvr>
+                                      <p:to>
+                                        <p:strVal val="visible"/>
+                                      </p:to>
+                                    </p:set>
+                                  </p:childTnLst>
+                                </p:cTn>
+                              </p:par>
+                            </p:childTnLst>
+                          </p:cTn>
+                        </p:par>
+                      </p:childTnLst>
+                    </p:cTn>
+                  </p:par>
+                  <p:par>
+                    <p:cTn id="7" fill="hold">
+                      <p:stCondLst>
+                        <p:cond delay="indefinite"/>
+                      </p:stCondLst>
+                      <p:childTnLst>
+                        <p:par>
+                          <p:cTn id="8" fill="hold">
+                            <p:stCondLst>
+                              <p:cond delay="0"/>
+                            </p:stCondLst>
+                            <p:childTnLst>
+                              <p:par>
+                                <p:cTn id="9" presetID="1" presetClass="entr" presetSubtype="0" fill="hold" nodeType="clickEffect">
+                                  <p:stCondLst>
+                                    <p:cond delay="0"/>
+                                  </p:stCondLst>
+                                  <p:childTnLst>
+                                    <p:set>
+                                      <p:cBhvr>
+                                        <p:cTn id="10" dur="1" fill="hold">
+                                          <p:stCondLst>
+                                            <p:cond delay="0"/>
+                                          </p:stCondLst>
+                                        </p:cTn>
+                                        <p:tgtEl>
+                                          <p:spTgt spid="10"/>
+                                        </p:tgtEl>
+                                        <p:attrNameLst>
+                                          <p:attrName>style.visibility</p:attrName>
+                                        </p:attrNameLst>
+                                      </p:cBhvr>
+                                      <p:to>
+                                        <p:strVal val="visible"/>
+                                      </p:to>
+                                    </p:set>
+                                  </p:childTnLst>
+                                </p:cTn>
+                              </p:par>
+                            </p:childTnLst>
+                          </p:cTn>
+                        </p:par>
+                      </p:childTnLst>
+                    </p:cTn>
+                  </p:par>
+                </p:childTnLst>
+              </p:cTn>
+              <p:prevCondLst>
+                <p:cond evt="onPrev" delay="0">
+                  <p:tgtEl>
+                    <p:sldTgt/>
+                  </p:tgtEl>
+                </p:cond>
+              </p:prevCondLst>
+              <p:nextCondLst>
+                <p:cond evt="onNext" delay="0">
+                  <p:tgtEl>
+                    <p:sldTgt/>
+                  </p:tgtEl>
+                </p:cond>
+              </p:nextCondLst>
+            </p:seq>
+          </p:childTnLst>
+        </p:cTn>
+      </p:par>
+    </p:tnLst>
+  </p:timing>
+</p:sld>
+</file>
+
+<file path=ppt/slides/slide7.xml><?xml version="1.0" encoding="utf-8"?>
+<p:sld xmlns:a="http://schemas.openxmlformats.org/drawingml/2006/main" xmlns:r="http://schemas.openxmlformats.org/officeDocument/2006/relationships" xmlns:p="http://schemas.openxmlformats.org/presentationml/2006/main">
+  <p:cSld>
+    <p:bg>
+      <p:bgPr>
+        <a:blipFill dpi="0" rotWithShape="1">
+          <a:blip r:embed="rId2">
+            <a:alphaModFix amt="41000"/>
+            <a:lum/>
+          </a:blip>
+          <a:srcRect/>
+          <a:stretch>
+            <a:fillRect t="-9000" b="-9000"/>
+          </a:stretch>
+        </a:blipFill>
+        <a:effectLst/>
+      </p:bgPr>
+    </p:bg>
+    <p:spTree>
+      <p:nvGrpSpPr>
+        <p:cNvPr id="1" name=""/>
+        <p:cNvGrpSpPr/>
+        <p:nvPr/>
+      </p:nvGrpSpPr>
+      <p:grpSpPr>
+        <a:xfrm>
+          <a:off x="0" y="0"/>
+          <a:ext cx="0" cy="0"/>
+          <a:chOff x="0" y="0"/>
+          <a:chExt cx="0" cy="0"/>
+        </a:xfrm>
+      </p:grpSpPr>
+      <p:sp>
+        <p:nvSpPr>
+          <p:cNvPr id="2" name="Title 1">
+            <a:extLst>
+              <a:ext uri="{FF2B5EF4-FFF2-40B4-BE49-F238E27FC236}">
+                <a16:creationId xmlns:a16="http://schemas.microsoft.com/office/drawing/2014/main" id="{EB63F8CA-BCBA-4BB7-ACBB-02B3D688E55D}"/>
+              </a:ext>
+            </a:extLst>
+          </p:cNvPr>
+          <p:cNvSpPr>
+            <a:spLocks noGrp="1"/>
+          </p:cNvSpPr>
+          <p:nvPr>
+            <p:ph type="title"/>
+          </p:nvPr>
+        </p:nvSpPr>
+        <p:spPr/>
+        <p:txBody>
+          <a:bodyPr/>
+          <a:lstStyle/>
+          <a:p>
+            <a:r>
+              <a:rPr lang="en-US" b="1" dirty="0"/>
+              <a:t>We Used..</a:t>
+            </a:r>
+          </a:p>
+        </p:txBody>
+      </p:sp>
+      <p:sp>
+        <p:nvSpPr>
+          <p:cNvPr id="3" name="Content Placeholder 2">
+            <a:extLst>
+              <a:ext uri="{FF2B5EF4-FFF2-40B4-BE49-F238E27FC236}">
+                <a16:creationId xmlns:a16="http://schemas.microsoft.com/office/drawing/2014/main" id="{2B6C8092-4E1D-47CF-8F42-65DE8028D3BC}"/>
+              </a:ext>
+            </a:extLst>
+          </p:cNvPr>
+          <p:cNvSpPr>
+            <a:spLocks noGrp="1"/>
+          </p:cNvSpPr>
+          <p:nvPr>
+            <p:ph idx="1"/>
+          </p:nvPr>
+        </p:nvSpPr>
+        <p:spPr/>
+        <p:txBody>
+          <a:bodyPr>
+            <a:normAutofit/>
+          </a:bodyPr>
+          <a:lstStyle/>
+          <a:p>
+            <a:pPr lvl="1"/>
+            <a:r>
+              <a:rPr lang="en-US" dirty="0"/>
+              <a:t>Requests</a:t>
+            </a:r>
+          </a:p>
+          <a:p>
+            <a:pPr lvl="2"/>
+            <a:r>
+              <a:rPr lang="en-US" dirty="0"/>
+              <a:t>To collect all of our data via APIs.</a:t>
+            </a:r>
+          </a:p>
+          <a:p>
+            <a:pPr lvl="1"/>
+            <a:r>
+              <a:rPr lang="en-US" dirty="0"/>
+              <a:t>Datetime</a:t>
+            </a:r>
+          </a:p>
+          <a:p>
+            <a:pPr lvl="2"/>
+            <a:r>
+              <a:rPr lang="en-US" dirty="0"/>
+              <a:t>To convert all the date strings.</a:t>
+            </a:r>
+          </a:p>
+          <a:p>
+            <a:pPr lvl="1"/>
+            <a:r>
+              <a:rPr lang="en-US" dirty="0"/>
+              <a:t>Pandas</a:t>
+            </a:r>
+          </a:p>
+          <a:p>
+            <a:pPr lvl="2"/>
+            <a:r>
+              <a:rPr lang="en-US" dirty="0"/>
+              <a:t>To connect all the data.</a:t>
+            </a:r>
+          </a:p>
+          <a:p>
+            <a:pPr lvl="1"/>
+            <a:r>
+              <a:rPr lang="en-US" dirty="0"/>
+              <a:t>Matplotlib</a:t>
+            </a:r>
+          </a:p>
+          <a:p>
+            <a:pPr lvl="2"/>
+            <a:r>
+              <a:rPr lang="en-US" dirty="0"/>
+              <a:t>To test our data’s relevance.</a:t>
+            </a:r>
+          </a:p>
+          <a:p>
+            <a:pPr lvl="1"/>
+            <a:r>
+              <a:rPr lang="en-US" dirty="0" err="1"/>
+              <a:t>SKLearn</a:t>
+            </a:r>
+            <a:r>
+              <a:rPr lang="en-US" dirty="0"/>
+              <a:t> Support Vector Classification</a:t>
+            </a:r>
+          </a:p>
+          <a:p>
+            <a:pPr lvl="2"/>
+            <a:r>
+              <a:rPr lang="en-US" dirty="0"/>
+              <a:t>To create our model.</a:t>
+            </a:r>
+          </a:p>
+        </p:txBody>
+      </p:sp>
+    </p:spTree>
+    <p:extLst>
+      <p:ext uri="{BB962C8B-B14F-4D97-AF65-F5344CB8AC3E}">
+        <p14:creationId xmlns:p14="http://schemas.microsoft.com/office/powerpoint/2010/main" val="2995464641"/>
+      </p:ext>
+    </p:extLst>
+  </p:cSld>
+  <p:clrMapOvr>
+    <a:masterClrMapping/>
+  </p:clrMapOvr>
+  <p:timing>
+    <p:tnLst>
+      <p:par>
+        <p:cTn id="1" dur="indefinite" restart="never" nodeType="tmRoot">
+          <p:childTnLst>
+            <p:seq concurrent="1" nextAc="seek">
+              <p:cTn id="2" dur="indefinite" nodeType="mainSeq">
+                <p:childTnLst>
+                  <p:par>
+                    <p:cTn id="3" fill="hold">
+                      <p:stCondLst>
+                        <p:cond delay="indefinite"/>
+                      </p:stCondLst>
+                      <p:childTnLst>
+                        <p:par>
+                          <p:cTn id="4" fill="hold">
+                            <p:stCondLst>
+                              <p:cond delay="0"/>
+                            </p:stCondLst>
+                            <p:childTnLst>
+                              <p:par>
+                                <p:cTn id="5" presetID="42" presetClass="entr" presetSubtype="0" fill="hold" nodeType="clickEffect">
+                                  <p:stCondLst>
+                                    <p:cond delay="0"/>
+                                  </p:stCondLst>
+                                  <p:childTnLst>
+                                    <p:set>
+                                      <p:cBhvr>
+                                        <p:cTn id="6" dur="1" fill="hold">
+                                          <p:stCondLst>
+                                            <p:cond delay="0"/>
+                                          </p:stCondLst>
+                                        </p:cTn>
+                                        <p:tgtEl>
+                                          <p:spTgt spid="3">
+                                            <p:txEl>
+                                              <p:pRg st="0" end="0"/>
+                                            </p:txEl>
+                                          </p:spTgt>
+                                        </p:tgtEl>
+                                        <p:attrNameLst>
+                                          <p:attrName>style.visibility</p:attrName>
+                                        </p:attrNameLst>
+                                      </p:cBhvr>
+                                      <p:to>
+                                        <p:strVal val="visible"/>
+                                      </p:to>
+                                    </p:set>
+                                    <p:animEffect transition="in" filter="fade">
+                                      <p:cBhvr>
+                                        <p:cTn id="7" dur="1000"/>
+                                        <p:tgtEl>
+                                          <p:spTgt spid="3">
+                                            <p:txEl>
+                                              <p:pRg st="0" end="0"/>
+                                            </p:txEl>
+                                          </p:spTgt>
+                                        </p:tgtEl>
+                                      </p:cBhvr>
+                                    </p:animEffect>
+                                    <p:anim calcmode="lin" valueType="num">
+                                      <p:cBhvr>
+                                        <p:cTn id="8" dur="1000" fill="hold"/>
+                                        <p:tgtEl>
+                                          <p:spTgt spid="3">
+                                            <p:txEl>
+                                              <p:pRg st="0" end="0"/>
+                                            </p:txEl>
+                                          </p:spTgt>
+                                        </p:tgtEl>
+                                        <p:attrNameLst>
+                                          <p:attrName>ppt_x</p:attrName>
+                                        </p:attrNameLst>
+                                      </p:cBhvr>
+                                      <p:tavLst>
+                                        <p:tav tm="0">
+                                          <p:val>
+                                            <p:strVal val="#ppt_x"/>
+                                          </p:val>
+                                        </p:tav>
+                                        <p:tav tm="100000">
+                                          <p:val>
+                                            <p:strVal val="#ppt_x"/>
+                                          </p:val>
+                                        </p:tav>
+                                      </p:tavLst>
+                                    </p:anim>
+                                    <p:anim calcmode="lin" valueType="num">
+                                      <p:cBhvr>
+                                        <p:cTn id="9" dur="1000" fill="hold"/>
+                                        <p:tgtEl>
+                                          <p:spTgt spid="3">
+                                            <p:txEl>
+                                              <p:pRg st="0" end="0"/>
+                                            </p:txEl>
+                                          </p:spTgt>
+                                        </p:tgtEl>
+                                        <p:attrNameLst>
+                                          <p:attrName>ppt_y</p:attrName>
+                                        </p:attrNameLst>
+                                      </p:cBhvr>
+                                      <p:tavLst>
+                                        <p:tav tm="0">
+                                          <p:val>
+                                            <p:strVal val="#ppt_y+.1"/>
+                                          </p:val>
+                                        </p:tav>
+                                        <p:tav tm="100000">
+                                          <p:val>
+                                            <p:strVal val="#ppt_y"/>
+                                          </p:val>
+                                        </p:tav>
+                                      </p:tavLst>
+                                    </p:anim>
+                                  </p:childTnLst>
+                                </p:cTn>
+                              </p:par>
+                            </p:childTnLst>
+                          </p:cTn>
+                        </p:par>
+                      </p:childTnLst>
+                    </p:cTn>
+                  </p:par>
+                  <p:par>
+                    <p:cTn id="10" fill="hold">
+                      <p:stCondLst>
+                        <p:cond delay="indefinite"/>
+                      </p:stCondLst>
+                      <p:childTnLst>
+                        <p:par>
+                          <p:cTn id="11" fill="hold">
+                            <p:stCondLst>
+                              <p:cond delay="0"/>
+                            </p:stCondLst>
+                            <p:childTnLst>
+                              <p:par>
+                                <p:cTn id="12" presetID="42" presetClass="entr" presetSubtype="0" fill="hold" nodeType="clickEffect">
+                                  <p:stCondLst>
+                                    <p:cond delay="0"/>
+                                  </p:stCondLst>
+                                  <p:childTnLst>
+                                    <p:set>
+                                      <p:cBhvr>
+                                        <p:cTn id="13" dur="1" fill="hold">
+                                          <p:stCondLst>
+                                            <p:cond delay="0"/>
+                                          </p:stCondLst>
+                                        </p:cTn>
+                                        <p:tgtEl>
+                                          <p:spTgt spid="3">
+                                            <p:txEl>
+                                              <p:pRg st="1" end="1"/>
+                                            </p:txEl>
+                                          </p:spTgt>
+                                        </p:tgtEl>
+                                        <p:attrNameLst>
+                                          <p:attrName>style.visibility</p:attrName>
+                                        </p:attrNameLst>
+                                      </p:cBhvr>
+                                      <p:to>
+                                        <p:strVal val="visible"/>
+                                      </p:to>
+                                    </p:set>
+                                    <p:animEffect transition="in" filter="fade">
+                                      <p:cBhvr>
+                                        <p:cTn id="14" dur="1000"/>
+                                        <p:tgtEl>
+                                          <p:spTgt spid="3">
+                                            <p:txEl>
+                                              <p:pRg st="1" end="1"/>
+                                            </p:txEl>
+                                          </p:spTgt>
+                                        </p:tgtEl>
+                                      </p:cBhvr>
+                                    </p:animEffect>
+                                    <p:anim calcmode="lin" valueType="num">
+                                      <p:cBhvr>
+                                        <p:cTn id="15" dur="1000" fill="hold"/>
+                                        <p:tgtEl>
+                                          <p:spTgt spid="3">
+                                            <p:txEl>
+                                              <p:pRg st="1" end="1"/>
+                                            </p:txEl>
+                                          </p:spTgt>
+                                        </p:tgtEl>
+                                        <p:attrNameLst>
+                                          <p:attrName>ppt_x</p:attrName>
+                                        </p:attrNameLst>
+                                      </p:cBhvr>
+                                      <p:tavLst>
+                                        <p:tav tm="0">
+                                          <p:val>
+                                            <p:strVal val="#ppt_x"/>
+                                          </p:val>
+                                        </p:tav>
+                                        <p:tav tm="100000">
+                                          <p:val>
+                                            <p:strVal val="#ppt_x"/>
+                                          </p:val>
+                                        </p:tav>
+                                      </p:tavLst>
+                                    </p:anim>
+                                    <p:anim calcmode="lin" valueType="num">
+                                      <p:cBhvr>
+                                        <p:cTn id="16" dur="1000" fill="hold"/>
+                                        <p:tgtEl>
+                                          <p:spTgt spid="3">
+                                            <p:txEl>
+                                              <p:pRg st="1" end="1"/>
+                                            </p:txEl>
+                                          </p:spTgt>
+                                        </p:tgtEl>
+                                        <p:attrNameLst>
+                                          <p:attrName>ppt_y</p:attrName>
+                                        </p:attrNameLst>
+                                      </p:cBhvr>
+                                      <p:tavLst>
+                                        <p:tav tm="0">
+                                          <p:val>
+                                            <p:strVal val="#ppt_y+.1"/>
+                                          </p:val>
+                                        </p:tav>
+                                        <p:tav tm="100000">
+                                          <p:val>
+                                            <p:strVal val="#ppt_y"/>
+                                          </p:val>
+                                        </p:tav>
+                                      </p:tavLst>
+                                    </p:anim>
+                                  </p:childTnLst>
+                                </p:cTn>
+                              </p:par>
+                            </p:childTnLst>
+                          </p:cTn>
+                        </p:par>
+                      </p:childTnLst>
+                    </p:cTn>
+                  </p:par>
+                  <p:par>
+                    <p:cTn id="17" fill="hold">
+                      <p:stCondLst>
+                        <p:cond delay="indefinite"/>
+                      </p:stCondLst>
+                      <p:childTnLst>
+                        <p:par>
+                          <p:cTn id="18" fill="hold">
+                            <p:stCondLst>
+                              <p:cond delay="0"/>
+                            </p:stCondLst>
+                            <p:childTnLst>
+                              <p:par>
+                                <p:cTn id="19" presetID="42" presetClass="entr" presetSubtype="0" fill="hold" nodeType="clickEffect">
+                                  <p:stCondLst>
+                                    <p:cond delay="0"/>
+                                  </p:stCondLst>
+                                  <p:childTnLst>
+                                    <p:set>
+                                      <p:cBhvr>
+                                        <p:cTn id="20" dur="1" fill="hold">
+                                          <p:stCondLst>
+                                            <p:cond delay="0"/>
+                                          </p:stCondLst>
+                                        </p:cTn>
+                                        <p:tgtEl>
+                                          <p:spTgt spid="3">
+                                            <p:txEl>
+                                              <p:pRg st="2" end="2"/>
+                                            </p:txEl>
+                                          </p:spTgt>
+                                        </p:tgtEl>
+                                        <p:attrNameLst>
+                                          <p:attrName>style.visibility</p:attrName>
+                                        </p:attrNameLst>
+                                      </p:cBhvr>
+                                      <p:to>
+                                        <p:strVal val="visible"/>
+                                      </p:to>
+                                    </p:set>
+                                    <p:animEffect transition="in" filter="fade">
+                                      <p:cBhvr>
+                                        <p:cTn id="21" dur="1000"/>
+                                        <p:tgtEl>
+                                          <p:spTgt spid="3">
+                                            <p:txEl>
+                                              <p:pRg st="2" end="2"/>
+                                            </p:txEl>
+                                          </p:spTgt>
+                                        </p:tgtEl>
+                                      </p:cBhvr>
+                                    </p:animEffect>
+                                    <p:anim calcmode="lin" valueType="num">
+                                      <p:cBhvr>
+                                        <p:cTn id="22" dur="1000" fill="hold"/>
+                                        <p:tgtEl>
+                                          <p:spTgt spid="3">
+                                            <p:txEl>
+                                              <p:pRg st="2" end="2"/>
+                                            </p:txEl>
+                                          </p:spTgt>
+                                        </p:tgtEl>
+                                        <p:attrNameLst>
+                                          <p:attrName>ppt_x</p:attrName>
+                                        </p:attrNameLst>
+                                      </p:cBhvr>
+                                      <p:tavLst>
+                                        <p:tav tm="0">
+                                          <p:val>
+                                            <p:strVal val="#ppt_x"/>
+                                          </p:val>
+                                        </p:tav>
+                                        <p:tav tm="100000">
+                                          <p:val>
+                                            <p:strVal val="#ppt_x"/>
+                                          </p:val>
+                                        </p:tav>
+                                      </p:tavLst>
+                                    </p:anim>
+                                    <p:anim calcmode="lin" valueType="num">
+                                      <p:cBhvr>
+                                        <p:cTn id="23" dur="1000" fill="hold"/>
+                                        <p:tgtEl>
+                                          <p:spTgt spid="3">
+                                            <p:txEl>
+                                              <p:pRg st="2" end="2"/>
+                                            </p:txEl>
+                                          </p:spTgt>
+                                        </p:tgtEl>
+                                        <p:attrNameLst>
+                                          <p:attrName>ppt_y</p:attrName>
+                                        </p:attrNameLst>
+                                      </p:cBhvr>
+                                      <p:tavLst>
+                                        <p:tav tm="0">
+                                          <p:val>
+                                            <p:strVal val="#ppt_y+.1"/>
+                                          </p:val>
+                                        </p:tav>
+                                        <p:tav tm="100000">
+                                          <p:val>
+                                            <p:strVal val="#ppt_y"/>
+                                          </p:val>
+                                        </p:tav>
+                                      </p:tavLst>
+                                    </p:anim>
+                                  </p:childTnLst>
+                                </p:cTn>
+                              </p:par>
+                            </p:childTnLst>
+                          </p:cTn>
+                        </p:par>
+                      </p:childTnLst>
+                    </p:cTn>
+                  </p:par>
+                  <p:par>
+                    <p:cTn id="24" fill="hold">
+                      <p:stCondLst>
+                        <p:cond delay="indefinite"/>
+                      </p:stCondLst>
+                      <p:childTnLst>
+                        <p:par>
+                          <p:cTn id="25" fill="hold">
+                            <p:stCondLst>
+                              <p:cond delay="0"/>
+                            </p:stCondLst>
+                            <p:childTnLst>
+                              <p:par>
+                                <p:cTn id="26" presetID="42" presetClass="entr" presetSubtype="0" fill="hold" nodeType="clickEffect">
+                                  <p:stCondLst>
+                                    <p:cond delay="0"/>
+                                  </p:stCondLst>
+                                  <p:childTnLst>
+                                    <p:set>
+                                      <p:cBhvr>
+                                        <p:cTn id="27" dur="1" fill="hold">
+                                          <p:stCondLst>
+                                            <p:cond delay="0"/>
+                                          </p:stCondLst>
+                                        </p:cTn>
+                                        <p:tgtEl>
+                                          <p:spTgt spid="3">
+                                            <p:txEl>
+                                              <p:pRg st="3" end="3"/>
+                                            </p:txEl>
+                                          </p:spTgt>
+                                        </p:tgtEl>
+                                        <p:attrNameLst>
+                                          <p:attrName>style.visibility</p:attrName>
+                                        </p:attrNameLst>
+                                      </p:cBhvr>
+                                      <p:to>
+                                        <p:strVal val="visible"/>
+                                      </p:to>
+                                    </p:set>
+                                    <p:animEffect transition="in" filter="fade">
+                                      <p:cBhvr>
+                                        <p:cTn id="28" dur="1000"/>
+                                        <p:tgtEl>
+                                          <p:spTgt spid="3">
+                                            <p:txEl>
+                                              <p:pRg st="3" end="3"/>
+                                            </p:txEl>
+                                          </p:spTgt>
+                                        </p:tgtEl>
+                                      </p:cBhvr>
+                                    </p:animEffect>
+                                    <p:anim calcmode="lin" valueType="num">
+                                      <p:cBhvr>
+                                        <p:cTn id="29" dur="1000" fill="hold"/>
+                                        <p:tgtEl>
+                                          <p:spTgt spid="3">
+                                            <p:txEl>
+                                              <p:pRg st="3" end="3"/>
+                                            </p:txEl>
+                                          </p:spTgt>
+                                        </p:tgtEl>
+                                        <p:attrNameLst>
+                                          <p:attrName>ppt_x</p:attrName>
+                                        </p:attrNameLst>
+                                      </p:cBhvr>
+                                      <p:tavLst>
+                                        <p:tav tm="0">
+                                          <p:val>
+                                            <p:strVal val="#ppt_x"/>
+                                          </p:val>
+                                        </p:tav>
+                                        <p:tav tm="100000">
+                                          <p:val>
+                                            <p:strVal val="#ppt_x"/>
+                                          </p:val>
+                                        </p:tav>
+                                      </p:tavLst>
+                                    </p:anim>
+                                    <p:anim calcmode="lin" valueType="num">
+                                      <p:cBhvr>
+                                        <p:cTn id="30" dur="1000" fill="hold"/>
+                                        <p:tgtEl>
+                                          <p:spTgt spid="3">
+                                            <p:txEl>
+                                              <p:pRg st="3" end="3"/>
+                                            </p:txEl>
+                                          </p:spTgt>
+                                        </p:tgtEl>
+                                        <p:attrNameLst>
+                                          <p:attrName>ppt_y</p:attrName>
+                                        </p:attrNameLst>
+                                      </p:cBhvr>
+                                      <p:tavLst>
+                                        <p:tav tm="0">
+                                          <p:val>
+                                            <p:strVal val="#ppt_y+.1"/>
+                                          </p:val>
+                                        </p:tav>
+                                        <p:tav tm="100000">
+                                          <p:val>
+                                            <p:strVal val="#ppt_y"/>
+                                          </p:val>
+                                        </p:tav>
+                                      </p:tavLst>
+                                    </p:anim>
+                                  </p:childTnLst>
+                                </p:cTn>
+                              </p:par>
+                            </p:childTnLst>
+                          </p:cTn>
+                        </p:par>
+                      </p:childTnLst>
+                    </p:cTn>
+                  </p:par>
+                  <p:par>
+                    <p:cTn id="31" fill="hold">
+                      <p:stCondLst>
+                        <p:cond delay="indefinite"/>
+                      </p:stCondLst>
+                      <p:childTnLst>
+                        <p:par>
+                          <p:cTn id="32" fill="hold">
+                            <p:stCondLst>
+                              <p:cond delay="0"/>
+                            </p:stCondLst>
+                            <p:childTnLst>
+                              <p:par>
+                                <p:cTn id="33" presetID="42" presetClass="entr" presetSubtype="0" fill="hold" nodeType="clickEffect">
+                                  <p:stCondLst>
+                                    <p:cond delay="0"/>
+                                  </p:stCondLst>
+                                  <p:childTnLst>
+                                    <p:set>
+                                      <p:cBhvr>
+                                        <p:cTn id="34" dur="1" fill="hold">
+                                          <p:stCondLst>
+                                            <p:cond delay="0"/>
+                                          </p:stCondLst>
+                                        </p:cTn>
+                                        <p:tgtEl>
+                                          <p:spTgt spid="3">
+                                            <p:txEl>
+                                              <p:pRg st="4" end="4"/>
+                                            </p:txEl>
+                                          </p:spTgt>
+                                        </p:tgtEl>
+                                        <p:attrNameLst>
+                                          <p:attrName>style.visibility</p:attrName>
+                                        </p:attrNameLst>
+                                      </p:cBhvr>
+                                      <p:to>
+                                        <p:strVal val="visible"/>
+                                      </p:to>
+                                    </p:set>
+                                    <p:animEffect transition="in" filter="fade">
+                                      <p:cBhvr>
+                                        <p:cTn id="35" dur="1000"/>
+                                        <p:tgtEl>
+                                          <p:spTgt spid="3">
+                                            <p:txEl>
+                                              <p:pRg st="4" end="4"/>
+                                            </p:txEl>
+                                          </p:spTgt>
+                                        </p:tgtEl>
+                                      </p:cBhvr>
+                                    </p:animEffect>
+                                    <p:anim calcmode="lin" valueType="num">
+                                      <p:cBhvr>
+                                        <p:cTn id="36" dur="1000" fill="hold"/>
+                                        <p:tgtEl>
+                                          <p:spTgt spid="3">
+                                            <p:txEl>
+                                              <p:pRg st="4" end="4"/>
+                                            </p:txEl>
+                                          </p:spTgt>
+                                        </p:tgtEl>
+                                        <p:attrNameLst>
+                                          <p:attrName>ppt_x</p:attrName>
+                                        </p:attrNameLst>
+                                      </p:cBhvr>
+                                      <p:tavLst>
+                                        <p:tav tm="0">
+                                          <p:val>
+                                            <p:strVal val="#ppt_x"/>
+                                          </p:val>
+                                        </p:tav>
+                                        <p:tav tm="100000">
+                                          <p:val>
+                                            <p:strVal val="#ppt_x"/>
+                                          </p:val>
+                                        </p:tav>
+                                      </p:tavLst>
+                                    </p:anim>
+                                    <p:anim calcmode="lin" valueType="num">
+                                      <p:cBhvr>
+                                        <p:cTn id="37" dur="1000" fill="hold"/>
+                                        <p:tgtEl>
+                                          <p:spTgt spid="3">
+                                            <p:txEl>
+                                              <p:pRg st="4" end="4"/>
+                                            </p:txEl>
+                                          </p:spTgt>
+                                        </p:tgtEl>
+                                        <p:attrNameLst>
+                                          <p:attrName>ppt_y</p:attrName>
+                                        </p:attrNameLst>
+                                      </p:cBhvr>
+                                      <p:tavLst>
+                                        <p:tav tm="0">
+                                          <p:val>
+                                            <p:strVal val="#ppt_y+.1"/>
+                                          </p:val>
+                                        </p:tav>
+                                        <p:tav tm="100000">
+                                          <p:val>
+                                            <p:strVal val="#ppt_y"/>
+                                          </p:val>
+                                        </p:tav>
+                                      </p:tavLst>
+                                    </p:anim>
+                                  </p:childTnLst>
+                                </p:cTn>
+                              </p:par>
+                            </p:childTnLst>
+                          </p:cTn>
+                        </p:par>
+                      </p:childTnLst>
+                    </p:cTn>
+                  </p:par>
+                  <p:par>
+                    <p:cTn id="38" fill="hold">
+                      <p:stCondLst>
+                        <p:cond delay="indefinite"/>
+                      </p:stCondLst>
+                      <p:childTnLst>
+                        <p:par>
+                          <p:cTn id="39" fill="hold">
+                            <p:stCondLst>
+                              <p:cond delay="0"/>
+                            </p:stCondLst>
+                            <p:childTnLst>
+                              <p:par>
+                                <p:cTn id="40" presetID="42" presetClass="entr" presetSubtype="0" fill="hold" nodeType="clickEffect">
+                                  <p:stCondLst>
+                                    <p:cond delay="0"/>
+                                  </p:stCondLst>
+                                  <p:childTnLst>
+                                    <p:set>
+                                      <p:cBhvr>
+                                        <p:cTn id="41" dur="1" fill="hold">
+                                          <p:stCondLst>
+                                            <p:cond delay="0"/>
+                                          </p:stCondLst>
+                                        </p:cTn>
+                                        <p:tgtEl>
+                                          <p:spTgt spid="3">
+                                            <p:txEl>
+                                              <p:pRg st="5" end="5"/>
+                                            </p:txEl>
+                                          </p:spTgt>
+                                        </p:tgtEl>
+                                        <p:attrNameLst>
+                                          <p:attrName>style.visibility</p:attrName>
+                                        </p:attrNameLst>
+                                      </p:cBhvr>
+                                      <p:to>
+                                        <p:strVal val="visible"/>
+                                      </p:to>
+                                    </p:set>
+                                    <p:animEffect transition="in" filter="fade">
+                                      <p:cBhvr>
+                                        <p:cTn id="42" dur="1000"/>
+                                        <p:tgtEl>
+                                          <p:spTgt spid="3">
+                                            <p:txEl>
+                                              <p:pRg st="5" end="5"/>
+                                            </p:txEl>
+                                          </p:spTgt>
+                                        </p:tgtEl>
+                                      </p:cBhvr>
+                                    </p:animEffect>
+                                    <p:anim calcmode="lin" valueType="num">
+                                      <p:cBhvr>
+                                        <p:cTn id="43" dur="1000" fill="hold"/>
+                                        <p:tgtEl>
+                                          <p:spTgt spid="3">
+                                            <p:txEl>
+                                              <p:pRg st="5" end="5"/>
+                                            </p:txEl>
+                                          </p:spTgt>
+                                        </p:tgtEl>
+                                        <p:attrNameLst>
+                                          <p:attrName>ppt_x</p:attrName>
+                                        </p:attrNameLst>
+                                      </p:cBhvr>
+                                      <p:tavLst>
+                                        <p:tav tm="0">
+                                          <p:val>
+                                            <p:strVal val="#ppt_x"/>
+                                          </p:val>
+                                        </p:tav>
+                                        <p:tav tm="100000">
+                                          <p:val>
+                                            <p:strVal val="#ppt_x"/>
+                                          </p:val>
+                                        </p:tav>
+                                      </p:tavLst>
+                                    </p:anim>
+                                    <p:anim calcmode="lin" valueType="num">
+                                      <p:cBhvr>
+                                        <p:cTn id="44" dur="1000" fill="hold"/>
+                                        <p:tgtEl>
+                                          <p:spTgt spid="3">
+                                            <p:txEl>
+                                              <p:pRg st="5" end="5"/>
+                                            </p:txEl>
+                                          </p:spTgt>
+                                        </p:tgtEl>
+                                        <p:attrNameLst>
+                                          <p:attrName>ppt_y</p:attrName>
+                                        </p:attrNameLst>
+                                      </p:cBhvr>
+                                      <p:tavLst>
+                                        <p:tav tm="0">
+                                          <p:val>
+                                            <p:strVal val="#ppt_y+.1"/>
+                                          </p:val>
+                                        </p:tav>
+                                        <p:tav tm="100000">
+                                          <p:val>
+                                            <p:strVal val="#ppt_y"/>
+                                          </p:val>
+                                        </p:tav>
+                                      </p:tavLst>
+                                    </p:anim>
+                                  </p:childTnLst>
+                                </p:cTn>
+                              </p:par>
+                            </p:childTnLst>
+                          </p:cTn>
+                        </p:par>
+                      </p:childTnLst>
+                    </p:cTn>
+                  </p:par>
+                  <p:par>
+                    <p:cTn id="45" fill="hold">
+                      <p:stCondLst>
+                        <p:cond delay="indefinite"/>
+                      </p:stCondLst>
+                      <p:childTnLst>
+                        <p:par>
+                          <p:cTn id="46" fill="hold">
+                            <p:stCondLst>
+                              <p:cond delay="0"/>
+                            </p:stCondLst>
+                            <p:childTnLst>
+                              <p:par>
+                                <p:cTn id="47" presetID="42" presetClass="entr" presetSubtype="0" fill="hold" nodeType="clickEffect">
+                                  <p:stCondLst>
+                                    <p:cond delay="0"/>
+                                  </p:stCondLst>
+                                  <p:childTnLst>
+                                    <p:set>
+                                      <p:cBhvr>
+                                        <p:cTn id="48" dur="1" fill="hold">
+                                          <p:stCondLst>
+                                            <p:cond delay="0"/>
+                                          </p:stCondLst>
+                                        </p:cTn>
+                                        <p:tgtEl>
+                                          <p:spTgt spid="3">
+                                            <p:txEl>
+                                              <p:pRg st="6" end="6"/>
+                                            </p:txEl>
+                                          </p:spTgt>
+                                        </p:tgtEl>
+                                        <p:attrNameLst>
+                                          <p:attrName>style.visibility</p:attrName>
+                                        </p:attrNameLst>
+                                      </p:cBhvr>
+                                      <p:to>
+                                        <p:strVal val="visible"/>
+                                      </p:to>
+                                    </p:set>
+                                    <p:animEffect transition="in" filter="fade">
+                                      <p:cBhvr>
+                                        <p:cTn id="49" dur="1000"/>
+                                        <p:tgtEl>
+                                          <p:spTgt spid="3">
+                                            <p:txEl>
+                                              <p:pRg st="6" end="6"/>
+                                            </p:txEl>
+                                          </p:spTgt>
+                                        </p:tgtEl>
+                                      </p:cBhvr>
+                                    </p:animEffect>
+                                    <p:anim calcmode="lin" valueType="num">
+                                      <p:cBhvr>
+                                        <p:cTn id="50" dur="1000" fill="hold"/>
+                                        <p:tgtEl>
+                                          <p:spTgt spid="3">
+                                            <p:txEl>
+                                              <p:pRg st="6" end="6"/>
+                                            </p:txEl>
+                                          </p:spTgt>
+                                        </p:tgtEl>
+                                        <p:attrNameLst>
+                                          <p:attrName>ppt_x</p:attrName>
+                                        </p:attrNameLst>
+                                      </p:cBhvr>
+                                      <p:tavLst>
+                                        <p:tav tm="0">
+                                          <p:val>
+                                            <p:strVal val="#ppt_x"/>
+                                          </p:val>
+                                        </p:tav>
+                                        <p:tav tm="100000">
+                                          <p:val>
+                                            <p:strVal val="#ppt_x"/>
+                                          </p:val>
+                                        </p:tav>
+                                      </p:tavLst>
+                                    </p:anim>
+                                    <p:anim calcmode="lin" valueType="num">
+                                      <p:cBhvr>
+                                        <p:cTn id="51" dur="1000" fill="hold"/>
+                                        <p:tgtEl>
+                                          <p:spTgt spid="3">
+                                            <p:txEl>
+                                              <p:pRg st="6" end="6"/>
+                                            </p:txEl>
+                                          </p:spTgt>
+                                        </p:tgtEl>
+                                        <p:attrNameLst>
+                                          <p:attrName>ppt_y</p:attrName>
+                                        </p:attrNameLst>
+                                      </p:cBhvr>
+                                      <p:tavLst>
+                                        <p:tav tm="0">
+                                          <p:val>
+                                            <p:strVal val="#ppt_y+.1"/>
+                                          </p:val>
+                                        </p:tav>
+                                        <p:tav tm="100000">
+                                          <p:val>
+                                            <p:strVal val="#ppt_y"/>
+                                          </p:val>
+                                        </p:tav>
+                                      </p:tavLst>
+                                    </p:anim>
+                                  </p:childTnLst>
+                                </p:cTn>
+                              </p:par>
+                            </p:childTnLst>
+                          </p:cTn>
+                        </p:par>
+                      </p:childTnLst>
+                    </p:cTn>
+                  </p:par>
+                  <p:par>
+                    <p:cTn id="52" fill="hold">
+                      <p:stCondLst>
+                        <p:cond delay="indefinite"/>
+                      </p:stCondLst>
+                      <p:childTnLst>
+                        <p:par>
+                          <p:cTn id="53" fill="hold">
+                            <p:stCondLst>
+                              <p:cond delay="0"/>
+                            </p:stCondLst>
+                            <p:childTnLst>
+                              <p:par>
+                                <p:cTn id="54" presetID="42" presetClass="entr" presetSubtype="0" fill="hold" nodeType="clickEffect">
+                                  <p:stCondLst>
+                                    <p:cond delay="0"/>
+                                  </p:stCondLst>
+                                  <p:childTnLst>
+                                    <p:set>
+                                      <p:cBhvr>
+                                        <p:cTn id="55" dur="1" fill="hold">
+                                          <p:stCondLst>
+                                            <p:cond delay="0"/>
+                                          </p:stCondLst>
+                                        </p:cTn>
+                                        <p:tgtEl>
+                                          <p:spTgt spid="3">
+                                            <p:txEl>
+                                              <p:pRg st="7" end="7"/>
+                                            </p:txEl>
+                                          </p:spTgt>
+                                        </p:tgtEl>
+                                        <p:attrNameLst>
+                                          <p:attrName>style.visibility</p:attrName>
+                                        </p:attrNameLst>
+                                      </p:cBhvr>
+                                      <p:to>
+                                        <p:strVal val="visible"/>
+                                      </p:to>
+                                    </p:set>
+                                    <p:animEffect transition="in" filter="fade">
+                                      <p:cBhvr>
+                                        <p:cTn id="56" dur="1000"/>
+                                        <p:tgtEl>
+                                          <p:spTgt spid="3">
+                                            <p:txEl>
+                                              <p:pRg st="7" end="7"/>
+                                            </p:txEl>
+                                          </p:spTgt>
+                                        </p:tgtEl>
+                                      </p:cBhvr>
+                                    </p:animEffect>
+                                    <p:anim calcmode="lin" valueType="num">
+                                      <p:cBhvr>
+                                        <p:cTn id="57" dur="1000" fill="hold"/>
+                                        <p:tgtEl>
+                                          <p:spTgt spid="3">
+                                            <p:txEl>
+                                              <p:pRg st="7" end="7"/>
+                                            </p:txEl>
+                                          </p:spTgt>
+                                        </p:tgtEl>
+                                        <p:attrNameLst>
+                                          <p:attrName>ppt_x</p:attrName>
+                                        </p:attrNameLst>
+                                      </p:cBhvr>
+                                      <p:tavLst>
+                                        <p:tav tm="0">
+                                          <p:val>
+                                            <p:strVal val="#ppt_x"/>
+                                          </p:val>
+                                        </p:tav>
+                                        <p:tav tm="100000">
+                                          <p:val>
+                                            <p:strVal val="#ppt_x"/>
+                                          </p:val>
+                                        </p:tav>
+                                      </p:tavLst>
+                                    </p:anim>
+                                    <p:anim calcmode="lin" valueType="num">
+                                      <p:cBhvr>
+                                        <p:cTn id="58" dur="1000" fill="hold"/>
+                                        <p:tgtEl>
+                                          <p:spTgt spid="3">
+                                            <p:txEl>
+                                              <p:pRg st="7" end="7"/>
+                                            </p:txEl>
+                                          </p:spTgt>
+                                        </p:tgtEl>
+                                        <p:attrNameLst>
+                                          <p:attrName>ppt_y</p:attrName>
+                                        </p:attrNameLst>
+                                      </p:cBhvr>
+                                      <p:tavLst>
+                                        <p:tav tm="0">
+                                          <p:val>
+                                            <p:strVal val="#ppt_y+.1"/>
+                                          </p:val>
+                                        </p:tav>
+                                        <p:tav tm="100000">
+                                          <p:val>
+                                            <p:strVal val="#ppt_y"/>
+                                          </p:val>
+                                        </p:tav>
+                                      </p:tavLst>
+                                    </p:anim>
+                                  </p:childTnLst>
+                                </p:cTn>
+                              </p:par>
+                            </p:childTnLst>
+                          </p:cTn>
+                        </p:par>
+                      </p:childTnLst>
+                    </p:cTn>
+                  </p:par>
+                  <p:par>
+                    <p:cTn id="59" fill="hold">
+                      <p:stCondLst>
+                        <p:cond delay="indefinite"/>
+                      </p:stCondLst>
+                      <p:childTnLst>
+                        <p:par>
+                          <p:cTn id="60" fill="hold">
+                            <p:stCondLst>
+                              <p:cond delay="0"/>
+                            </p:stCondLst>
+                            <p:childTnLst>
+                              <p:par>
+                                <p:cTn id="61" presetID="42" presetClass="entr" presetSubtype="0" fill="hold" nodeType="clickEffect">
+                                  <p:stCondLst>
+                                    <p:cond delay="0"/>
+                                  </p:stCondLst>
+                                  <p:childTnLst>
+                                    <p:set>
+                                      <p:cBhvr>
+                                        <p:cTn id="62" dur="1" fill="hold">
+                                          <p:stCondLst>
+                                            <p:cond delay="0"/>
+                                          </p:stCondLst>
+                                        </p:cTn>
+                                        <p:tgtEl>
+                                          <p:spTgt spid="3">
+                                            <p:txEl>
+                                              <p:pRg st="8" end="8"/>
+                                            </p:txEl>
+                                          </p:spTgt>
+                                        </p:tgtEl>
+                                        <p:attrNameLst>
+                                          <p:attrName>style.visibility</p:attrName>
+                                        </p:attrNameLst>
+                                      </p:cBhvr>
+                                      <p:to>
+                                        <p:strVal val="visible"/>
+                                      </p:to>
+                                    </p:set>
+                                    <p:animEffect transition="in" filter="fade">
+                                      <p:cBhvr>
+                                        <p:cTn id="63" dur="1000"/>
+                                        <p:tgtEl>
+                                          <p:spTgt spid="3">
+                                            <p:txEl>
+                                              <p:pRg st="8" end="8"/>
+                                            </p:txEl>
+                                          </p:spTgt>
+                                        </p:tgtEl>
+                                      </p:cBhvr>
+                                    </p:animEffect>
+                                    <p:anim calcmode="lin" valueType="num">
+                                      <p:cBhvr>
+                                        <p:cTn id="64" dur="1000" fill="hold"/>
+                                        <p:tgtEl>
+                                          <p:spTgt spid="3">
+                                            <p:txEl>
+                                              <p:pRg st="8" end="8"/>
+                                            </p:txEl>
+                                          </p:spTgt>
+                                        </p:tgtEl>
+                                        <p:attrNameLst>
+                                          <p:attrName>ppt_x</p:attrName>
+                                        </p:attrNameLst>
+                                      </p:cBhvr>
+                                      <p:tavLst>
+                                        <p:tav tm="0">
+                                          <p:val>
+                                            <p:strVal val="#ppt_x"/>
+                                          </p:val>
+                                        </p:tav>
+                                        <p:tav tm="100000">
+                                          <p:val>
+                                            <p:strVal val="#ppt_x"/>
+                                          </p:val>
+                                        </p:tav>
+                                      </p:tavLst>
+                                    </p:anim>
+                                    <p:anim calcmode="lin" valueType="num">
+                                      <p:cBhvr>
+                                        <p:cTn id="65" dur="1000" fill="hold"/>
+                                        <p:tgtEl>
+                                          <p:spTgt spid="3">
+                                            <p:txEl>
+                                              <p:pRg st="8" end="8"/>
+                                            </p:txEl>
+                                          </p:spTgt>
+                                        </p:tgtEl>
+                                        <p:attrNameLst>
+                                          <p:attrName>ppt_y</p:attrName>
+                                        </p:attrNameLst>
+                                      </p:cBhvr>
+                                      <p:tavLst>
+                                        <p:tav tm="0">
+                                          <p:val>
+                                            <p:strVal val="#ppt_y+.1"/>
+                                          </p:val>
+                                        </p:tav>
+                                        <p:tav tm="100000">
+                                          <p:val>
+                                            <p:strVal val="#ppt_y"/>
+                                          </p:val>
+                                        </p:tav>
+                                      </p:tavLst>
+                                    </p:anim>
+                                  </p:childTnLst>
+                                </p:cTn>
+                              </p:par>
+                            </p:childTnLst>
+                          </p:cTn>
+                        </p:par>
+                      </p:childTnLst>
+                    </p:cTn>
+                  </p:par>
+                  <p:par>
+                    <p:cTn id="66" fill="hold">
+                      <p:stCondLst>
+                        <p:cond delay="indefinite"/>
+                      </p:stCondLst>
+                      <p:childTnLst>
+                        <p:par>
+                          <p:cTn id="67" fill="hold">
+                            <p:stCondLst>
+                              <p:cond delay="0"/>
+                            </p:stCondLst>
+                            <p:childTnLst>
+                              <p:par>
+                                <p:cTn id="68" presetID="42" presetClass="entr" presetSubtype="0" fill="hold" nodeType="clickEffect">
+                                  <p:stCondLst>
+                                    <p:cond delay="0"/>
+                                  </p:stCondLst>
+                                  <p:childTnLst>
+                                    <p:set>
+                                      <p:cBhvr>
+                                        <p:cTn id="69" dur="1" fill="hold">
+                                          <p:stCondLst>
+                                            <p:cond delay="0"/>
+                                          </p:stCondLst>
+                                        </p:cTn>
+                                        <p:tgtEl>
+                                          <p:spTgt spid="3">
+                                            <p:txEl>
+                                              <p:pRg st="9" end="9"/>
+                                            </p:txEl>
+                                          </p:spTgt>
+                                        </p:tgtEl>
+                                        <p:attrNameLst>
+                                          <p:attrName>style.visibility</p:attrName>
+                                        </p:attrNameLst>
+                                      </p:cBhvr>
+                                      <p:to>
+                                        <p:strVal val="visible"/>
+                                      </p:to>
+                                    </p:set>
+                                    <p:animEffect transition="in" filter="fade">
+                                      <p:cBhvr>
+                                        <p:cTn id="70" dur="1000"/>
+                                        <p:tgtEl>
+                                          <p:spTgt spid="3">
+                                            <p:txEl>
+                                              <p:pRg st="9" end="9"/>
+                                            </p:txEl>
+                                          </p:spTgt>
+                                        </p:tgtEl>
+                                      </p:cBhvr>
+                                    </p:animEffect>
+                                    <p:anim calcmode="lin" valueType="num">
+                                      <p:cBhvr>
+                                        <p:cTn id="71" dur="1000" fill="hold"/>
+                                        <p:tgtEl>
+                                          <p:spTgt spid="3">
+                                            <p:txEl>
+                                              <p:pRg st="9" end="9"/>
+                                            </p:txEl>
+                                          </p:spTgt>
+                                        </p:tgtEl>
+                                        <p:attrNameLst>
+                                          <p:attrName>ppt_x</p:attrName>
+                                        </p:attrNameLst>
+                                      </p:cBhvr>
+                                      <p:tavLst>
+                                        <p:tav tm="0">
+                                          <p:val>
+                                            <p:strVal val="#ppt_x"/>
+                                          </p:val>
+                                        </p:tav>
+                                        <p:tav tm="100000">
+                                          <p:val>
+                                            <p:strVal val="#ppt_x"/>
+                                          </p:val>
+                                        </p:tav>
+                                      </p:tavLst>
+                                    </p:anim>
+                                    <p:anim calcmode="lin" valueType="num">
+                                      <p:cBhvr>
+                                        <p:cTn id="72" dur="1000" fill="hold"/>
+                                        <p:tgtEl>
+                                          <p:spTgt spid="3">
+                                            <p:txEl>
+                                              <p:pRg st="9" end="9"/>
+                                            </p:txEl>
+                                          </p:spTgt>
+                                        </p:tgtEl>
+                                        <p:attrNameLst>
+                                          <p:attrName>ppt_y</p:attrName>
+                                        </p:attrNameLst>
+                                      </p:cBhvr>
+                                      <p:tavLst>
+                                        <p:tav tm="0">
+                                          <p:val>
+                                            <p:strVal val="#ppt_y+.1"/>
+                                          </p:val>
+                                        </p:tav>
+                                        <p:tav tm="100000">
+                                          <p:val>
+                                            <p:strVal val="#ppt_y"/>
+                                          </p:val>
+                                        </p:tav>
+                                      </p:tavLst>
+                                    </p:anim>
+                                  </p:childTnLst>
+                                </p:cTn>
+                              </p:par>
+                            </p:childTnLst>
+                          </p:cTn>
+                        </p:par>
+                      </p:childTnLst>
+                    </p:cTn>
+                  </p:par>
+                </p:childTnLst>
+              </p:cTn>
+              <p:prevCondLst>
+                <p:cond evt="onPrev" delay="0">
+                  <p:tgtEl>
+                    <p:sldTgt/>
+                  </p:tgtEl>
+                </p:cond>
+              </p:prevCondLst>
+              <p:nextCondLst>
+                <p:cond evt="onNext" delay="0">
+                  <p:tgtEl>
+                    <p:sldTgt/>
+                  </p:tgtEl>
+                </p:cond>
+              </p:nextCondLst>
+            </p:seq>
+          </p:childTnLst>
+        </p:cTn>
+      </p:par>
+    </p:tnLst>
+  </p:timing>
+</p:sld>
+</file>
+
+<file path=ppt/slides/slide8.xml><?xml version="1.0" encoding="utf-8"?>
+<p:sld xmlns:a="http://schemas.openxmlformats.org/drawingml/2006/main" xmlns:r="http://schemas.openxmlformats.org/officeDocument/2006/relationships" xmlns:p="http://schemas.openxmlformats.org/presentationml/2006/main">
+  <p:cSld>
+    <p:bg>
+      <p:bgPr>
+        <a:blipFill dpi="0" rotWithShape="1">
+          <a:blip r:embed="rId2">
+            <a:alphaModFix amt="41000"/>
+            <a:lum/>
+          </a:blip>
+          <a:srcRect/>
+          <a:stretch>
+            <a:fillRect t="-9000" b="-9000"/>
+          </a:stretch>
+        </a:blipFill>
+        <a:effectLst/>
+      </p:bgPr>
+    </p:bg>
+    <p:spTree>
+      <p:nvGrpSpPr>
+        <p:cNvPr id="1" name=""/>
+        <p:cNvGrpSpPr/>
+        <p:nvPr/>
+      </p:nvGrpSpPr>
+      <p:grpSpPr>
+        <a:xfrm>
+          <a:off x="0" y="0"/>
+          <a:ext cx="0" cy="0"/>
+          <a:chOff x="0" y="0"/>
+          <a:chExt cx="0" cy="0"/>
+        </a:xfrm>
+      </p:grpSpPr>
+      <p:sp>
+        <p:nvSpPr>
+          <p:cNvPr id="2" name="Title 1">
+            <a:extLst>
+              <a:ext uri="{FF2B5EF4-FFF2-40B4-BE49-F238E27FC236}">
+                <a16:creationId xmlns:a16="http://schemas.microsoft.com/office/drawing/2014/main" id="{EB63F8CA-BCBA-4BB7-ACBB-02B3D688E55D}"/>
+              </a:ext>
+            </a:extLst>
+          </p:cNvPr>
+          <p:cNvSpPr>
+            <a:spLocks noGrp="1"/>
+          </p:cNvSpPr>
+          <p:nvPr>
+            <p:ph type="title"/>
+          </p:nvPr>
+        </p:nvSpPr>
+        <p:spPr/>
+        <p:txBody>
+          <a:bodyPr/>
+          <a:lstStyle/>
+          <a:p>
+            <a:r>
+              <a:rPr lang="en-US" b="1" dirty="0"/>
+              <a:t>First Test</a:t>
+            </a:r>
+          </a:p>
+        </p:txBody>
+      </p:sp>
+      <p:pic>
+        <p:nvPicPr>
+          <p:cNvPr id="5" name="Content Placeholder 4">
+            <a:extLst>
+              <a:ext uri="{FF2B5EF4-FFF2-40B4-BE49-F238E27FC236}">
+                <a16:creationId xmlns:a16="http://schemas.microsoft.com/office/drawing/2014/main" id="{3C929027-8F97-416C-A6F1-64036CFFB18A}"/>
+              </a:ext>
+            </a:extLst>
+          </p:cNvPr>
+          <p:cNvPicPr>
+            <a:picLocks noGrp="1" noChangeAspect="1"/>
+          </p:cNvPicPr>
+          <p:nvPr>
+            <p:ph idx="1"/>
+          </p:nvPr>
+        </p:nvPicPr>
+        <p:blipFill>
+          <a:blip r:embed="rId3">
+            <a:extLst>
+              <a:ext uri="{28A0092B-C50C-407E-A947-70E740481C1C}">
+                <a14:useLocalDpi xmlns:a14="http://schemas.microsoft.com/office/drawing/2010/main" val="0"/>
+              </a:ext>
+            </a:extLst>
+          </a:blip>
+          <a:stretch>
+            <a:fillRect/>
+          </a:stretch>
+        </p:blipFill>
+        <p:spPr>
+          <a:xfrm>
+            <a:off x="1628151" y="1690688"/>
+            <a:ext cx="4467849" cy="1676634"/>
+          </a:xfrm>
+        </p:spPr>
+      </p:pic>
+      <p:pic>
+        <p:nvPicPr>
+          <p:cNvPr id="7" name="Picture 6">
+            <a:extLst>
+              <a:ext uri="{FF2B5EF4-FFF2-40B4-BE49-F238E27FC236}">
+                <a16:creationId xmlns:a16="http://schemas.microsoft.com/office/drawing/2014/main" id="{7FB4F2DF-A83E-46D4-A96A-709BC6BFC608}"/>
+              </a:ext>
+            </a:extLst>
+          </p:cNvPr>
+          <p:cNvPicPr>
+            <a:picLocks noChangeAspect="1"/>
+          </p:cNvPicPr>
+          <p:nvPr/>
+        </p:nvPicPr>
+        <p:blipFill>
+          <a:blip r:embed="rId4">
+            <a:extLst>
+              <a:ext uri="{28A0092B-C50C-407E-A947-70E740481C1C}">
+                <a14:useLocalDpi xmlns:a14="http://schemas.microsoft.com/office/drawing/2010/main" val="0"/>
+              </a:ext>
+            </a:extLst>
+          </a:blip>
+          <a:stretch>
+            <a:fillRect/>
+          </a:stretch>
+        </p:blipFill>
+        <p:spPr>
+          <a:xfrm>
+            <a:off x="6096000" y="1690688"/>
+            <a:ext cx="4639322" cy="2448267"/>
+          </a:xfrm>
+          <a:prstGeom prst="rect">
+            <a:avLst/>
+          </a:prstGeom>
+        </p:spPr>
+      </p:pic>
+    </p:spTree>
+    <p:extLst>
+      <p:ext uri="{BB962C8B-B14F-4D97-AF65-F5344CB8AC3E}">
+        <p14:creationId xmlns:p14="http://schemas.microsoft.com/office/powerpoint/2010/main" val="1694971610"/>
+      </p:ext>
+    </p:extLst>
+  </p:cSld>
+  <p:clrMapOvr>
+    <a:masterClrMapping/>
+  </p:clrMapOvr>
+  <p:timing>
+    <p:tnLst>
+      <p:par>
+        <p:cTn id="1" dur="indefinite" restart="never" nodeType="tmRoot">
+          <p:childTnLst>
+            <p:seq concurrent="1" nextAc="seek">
+              <p:cTn id="2" dur="indefinite" nodeType="mainSeq">
+                <p:childTnLst>
+                  <p:par>
+                    <p:cTn id="3" fill="hold">
+                      <p:stCondLst>
+                        <p:cond delay="indefinite"/>
+                      </p:stCondLst>
+                      <p:childTnLst>
+                        <p:par>
+                          <p:cTn id="4" fill="hold">
+                            <p:stCondLst>
+                              <p:cond delay="0"/>
+                            </p:stCondLst>
+                            <p:childTnLst>
+                              <p:par>
+                                <p:cTn id="5" presetID="2" presetClass="entr" presetSubtype="4" fill="hold" nodeType="clickEffect">
+                                  <p:stCondLst>
+                                    <p:cond delay="0"/>
+                                  </p:stCondLst>
+                                  <p:childTnLst>
+                                    <p:set>
+                                      <p:cBhvr>
+                                        <p:cTn id="6" dur="1" fill="hold">
+                                          <p:stCondLst>
+                                            <p:cond delay="0"/>
+                                          </p:stCondLst>
+                                        </p:cTn>
+                                        <p:tgtEl>
+                                          <p:spTgt spid="5"/>
+                                        </p:tgtEl>
+                                        <p:attrNameLst>
+                                          <p:attrName>style.visibility</p:attrName>
+                                        </p:attrNameLst>
+                                      </p:cBhvr>
+                                      <p:to>
+                                        <p:strVal val="visible"/>
+                                      </p:to>
+                                    </p:set>
+                                    <p:anim calcmode="lin" valueType="num">
+                                      <p:cBhvr additive="base">
+                                        <p:cTn id="7" dur="500" fill="hold"/>
+                                        <p:tgtEl>
+                                          <p:spTgt spid="5"/>
+                                        </p:tgtEl>
+                                        <p:attrNameLst>
+                                          <p:attrName>ppt_x</p:attrName>
+                                        </p:attrNameLst>
+                                      </p:cBhvr>
+                                      <p:tavLst>
+                                        <p:tav tm="0">
+                                          <p:val>
+                                            <p:strVal val="#ppt_x"/>
+                                          </p:val>
+                                        </p:tav>
+                                        <p:tav tm="100000">
+                                          <p:val>
+                                            <p:strVal val="#ppt_x"/>
+                                          </p:val>
+                                        </p:tav>
+                                      </p:tavLst>
+                                    </p:anim>
+                                    <p:anim calcmode="lin" valueType="num">
+                                      <p:cBhvr additive="base">
+                                        <p:cTn id="8" dur="500" fill="hold"/>
+                                        <p:tgtEl>
+                                          <p:spTgt spid="5"/>
+                                        </p:tgtEl>
+                                        <p:attrNameLst>
+                                          <p:attrName>ppt_y</p:attrName>
+                                        </p:attrNameLst>
+                                      </p:cBhvr>
+                                      <p:tavLst>
+                                        <p:tav tm="0">
+                                          <p:val>
+                                            <p:strVal val="1+#ppt_h/2"/>
+                                          </p:val>
+                                        </p:tav>
+                                        <p:tav tm="100000">
+                                          <p:val>
+                                            <p:strVal val="#ppt_y"/>
+                                          </p:val>
+                                        </p:tav>
+                                      </p:tavLst>
+                                    </p:anim>
+                                  </p:childTnLst>
+                                </p:cTn>
+                              </p:par>
+                            </p:childTnLst>
+                          </p:cTn>
+                        </p:par>
+                      </p:childTnLst>
+                    </p:cTn>
+                  </p:par>
+                  <p:par>
+                    <p:cTn id="9" fill="hold">
+                      <p:stCondLst>
+                        <p:cond delay="indefinite"/>
+                      </p:stCondLst>
+                      <p:childTnLst>
+                        <p:par>
+                          <p:cTn id="10" fill="hold">
+                            <p:stCondLst>
+                              <p:cond delay="0"/>
+                            </p:stCondLst>
+                            <p:childTnLst>
+                              <p:par>
+                                <p:cTn id="11" presetID="42" presetClass="entr" presetSubtype="0" fill="hold" nodeType="clickEffect">
+                                  <p:stCondLst>
+                                    <p:cond delay="0"/>
+                                  </p:stCondLst>
+                                  <p:childTnLst>
+                                    <p:set>
+                                      <p:cBhvr>
+                                        <p:cTn id="12" dur="1" fill="hold">
+                                          <p:stCondLst>
+                                            <p:cond delay="0"/>
+                                          </p:stCondLst>
+                                        </p:cTn>
+                                        <p:tgtEl>
+                                          <p:spTgt spid="7"/>
+                                        </p:tgtEl>
+                                        <p:attrNameLst>
+                                          <p:attrName>style.visibility</p:attrName>
+                                        </p:attrNameLst>
+                                      </p:cBhvr>
+                                      <p:to>
+                                        <p:strVal val="visible"/>
+                                      </p:to>
+                                    </p:set>
+                                    <p:animEffect transition="in" filter="fade">
+                                      <p:cBhvr>
+                                        <p:cTn id="13" dur="1000"/>
+                                        <p:tgtEl>
+                                          <p:spTgt spid="7"/>
+                                        </p:tgtEl>
+                                      </p:cBhvr>
+                                    </p:animEffect>
+                                    <p:anim calcmode="lin" valueType="num">
+                                      <p:cBhvr>
+                                        <p:cTn id="14" dur="1000" fill="hold"/>
+                                        <p:tgtEl>
+                                          <p:spTgt spid="7"/>
+                                        </p:tgtEl>
+                                        <p:attrNameLst>
+                                          <p:attrName>ppt_x</p:attrName>
+                                        </p:attrNameLst>
+                                      </p:cBhvr>
+                                      <p:tavLst>
+                                        <p:tav tm="0">
+                                          <p:val>
+                                            <p:strVal val="#ppt_x"/>
+                                          </p:val>
+                                        </p:tav>
+                                        <p:tav tm="100000">
+                                          <p:val>
+                                            <p:strVal val="#ppt_x"/>
+                                          </p:val>
+                                        </p:tav>
+                                      </p:tavLst>
+                                    </p:anim>
+                                    <p:anim calcmode="lin" valueType="num">
+                                      <p:cBhvr>
+                                        <p:cTn id="15" dur="1000" fill="hold"/>
+                                        <p:tgtEl>
+                                          <p:spTgt spid="7"/>
+                                        </p:tgtEl>
+                                        <p:attrNameLst>
+                                          <p:attrName>ppt_y</p:attrName>
+                                        </p:attrNameLst>
+                                      </p:cBhvr>
+                                      <p:tavLst>
+                                        <p:tav tm="0">
+                                          <p:val>
+                                            <p:strVal val="#ppt_y+.1"/>
+                                          </p:val>
+                                        </p:tav>
+                                        <p:tav tm="100000">
+                                          <p:val>
+                                            <p:strVal val="#ppt_y"/>
+                                          </p:val>
+                                        </p:tav>
+                                      </p:tavLst>
+                                    </p:anim>
+                                  </p:childTnLst>
+                                </p:cTn>
+                              </p:par>
+                            </p:childTnLst>
+                          </p:cTn>
+                        </p:par>
+                      </p:childTnLst>
+                    </p:cTn>
+                  </p:par>
+                </p:childTnLst>
+              </p:cTn>
+              <p:prevCondLst>
+                <p:cond evt="onPrev" delay="0">
+                  <p:tgtEl>
+                    <p:sldTgt/>
+                  </p:tgtEl>
+                </p:cond>
+              </p:prevCondLst>
+              <p:nextCondLst>
+                <p:cond evt="onNext" delay="0">
+                  <p:tgtEl>
+                    <p:sldTgt/>
+                  </p:tgtEl>
+                </p:cond>
+              </p:nextCondLst>
+            </p:seq>
+          </p:childTnLst>
+        </p:cTn>
+      </p:par>
+    </p:tnLst>
+  </p:timing>
+</p:sld>
+</file>
+
+<file path=ppt/slides/slide9.xml><?xml version="1.0" encoding="utf-8"?>
+<p:sld xmlns:a="http://schemas.openxmlformats.org/drawingml/2006/main" xmlns:r="http://schemas.openxmlformats.org/officeDocument/2006/relationships" xmlns:p="http://schemas.openxmlformats.org/presentationml/2006/main">
+  <p:cSld>
+    <p:bg>
+      <p:bgPr>
+        <a:blipFill dpi="0" rotWithShape="1">
+          <a:blip r:embed="rId2">
+            <a:alphaModFix amt="41000"/>
+            <a:lum/>
+          </a:blip>
+          <a:srcRect/>
+          <a:stretch>
+            <a:fillRect t="-9000" b="-9000"/>
+          </a:stretch>
+        </a:blipFill>
+        <a:effectLst/>
+      </p:bgPr>
+    </p:bg>
+    <p:spTree>
+      <p:nvGrpSpPr>
+        <p:cNvPr id="1" name=""/>
+        <p:cNvGrpSpPr/>
+        <p:nvPr/>
+      </p:nvGrpSpPr>
+      <p:grpSpPr>
+        <a:xfrm>
+          <a:off x="0" y="0"/>
+          <a:ext cx="0" cy="0"/>
+          <a:chOff x="0" y="0"/>
+          <a:chExt cx="0" cy="0"/>
+        </a:xfrm>
+      </p:grpSpPr>
+      <p:sp>
+        <p:nvSpPr>
+          <p:cNvPr id="2" name="Title 1">
+            <a:extLst>
+              <a:ext uri="{FF2B5EF4-FFF2-40B4-BE49-F238E27FC236}">
+                <a16:creationId xmlns:a16="http://schemas.microsoft.com/office/drawing/2014/main" id="{EB63F8CA-BCBA-4BB7-ACBB-02B3D688E55D}"/>
+              </a:ext>
+            </a:extLst>
+          </p:cNvPr>
+          <p:cNvSpPr>
+            <a:spLocks noGrp="1"/>
+          </p:cNvSpPr>
+          <p:nvPr>
+            <p:ph type="title"/>
+          </p:nvPr>
+        </p:nvSpPr>
+        <p:spPr/>
+        <p:txBody>
+          <a:bodyPr/>
+          <a:lstStyle/>
+          <a:p>
+            <a:r>
+              <a:rPr lang="en-US" b="1" dirty="0"/>
+              <a:t>Second Test</a:t>
+            </a:r>
+          </a:p>
+        </p:txBody>
+      </p:sp>
+      <p:pic>
+        <p:nvPicPr>
+          <p:cNvPr id="8" name="Content Placeholder 7">
+            <a:extLst>
+              <a:ext uri="{FF2B5EF4-FFF2-40B4-BE49-F238E27FC236}">
+                <a16:creationId xmlns:a16="http://schemas.microsoft.com/office/drawing/2014/main" id="{4666FC18-3C6A-4F6F-B7E1-02AD51CEC31D}"/>
+              </a:ext>
+            </a:extLst>
+          </p:cNvPr>
+          <p:cNvPicPr>
+            <a:picLocks noGrp="1" noChangeAspect="1"/>
+          </p:cNvPicPr>
+          <p:nvPr>
+            <p:ph idx="1"/>
+          </p:nvPr>
+        </p:nvPicPr>
+        <p:blipFill>
+          <a:blip r:embed="rId3">
+            <a:extLst>
+              <a:ext uri="{28A0092B-C50C-407E-A947-70E740481C1C}">
+                <a14:useLocalDpi xmlns:a14="http://schemas.microsoft.com/office/drawing/2010/main" val="0"/>
+              </a:ext>
+            </a:extLst>
+          </a:blip>
+          <a:stretch>
+            <a:fillRect/>
+          </a:stretch>
+        </p:blipFill>
+        <p:spPr>
+          <a:xfrm>
+            <a:off x="789835" y="1690688"/>
+            <a:ext cx="5306165" cy="1800476"/>
+          </a:xfrm>
+        </p:spPr>
+      </p:pic>
+      <p:pic>
+        <p:nvPicPr>
+          <p:cNvPr id="10" name="Picture 9">
+            <a:extLst>
+              <a:ext uri="{FF2B5EF4-FFF2-40B4-BE49-F238E27FC236}">
+                <a16:creationId xmlns:a16="http://schemas.microsoft.com/office/drawing/2014/main" id="{3D05C408-664E-4534-80D9-36EBCD380C03}"/>
+              </a:ext>
+            </a:extLst>
+          </p:cNvPr>
+          <p:cNvPicPr>
+            <a:picLocks noChangeAspect="1"/>
+          </p:cNvPicPr>
+          <p:nvPr/>
+        </p:nvPicPr>
+        <p:blipFill>
+          <a:blip r:embed="rId4">
+            <a:extLst>
+              <a:ext uri="{28A0092B-C50C-407E-A947-70E740481C1C}">
+                <a14:useLocalDpi xmlns:a14="http://schemas.microsoft.com/office/drawing/2010/main" val="0"/>
+              </a:ext>
+            </a:extLst>
+          </a:blip>
+          <a:stretch>
+            <a:fillRect/>
+          </a:stretch>
+        </p:blipFill>
+        <p:spPr>
+          <a:xfrm>
+            <a:off x="6096000" y="1690688"/>
+            <a:ext cx="5772956" cy="2591162"/>
+          </a:xfrm>
+          <a:prstGeom prst="rect">
+            <a:avLst/>
+          </a:prstGeom>
+        </p:spPr>
+      </p:pic>
+    </p:spTree>
+    <p:extLst>
+      <p:ext uri="{BB962C8B-B14F-4D97-AF65-F5344CB8AC3E}">
+        <p14:creationId xmlns:p14="http://schemas.microsoft.com/office/powerpoint/2010/main" val="2742515289"/>
+      </p:ext>
+    </p:extLst>
+  </p:cSld>
+  <p:clrMapOvr>
+    <a:masterClrMapping/>
+  </p:clrMapOvr>
+  <p:timing>
+    <p:tnLst>
+      <p:par>
+        <p:cTn id="1" dur="indefinite" restart="never" nodeType="tmRoot">
+          <p:childTnLst>
+            <p:seq concurrent="1" nextAc="seek">
+              <p:cTn id="2" dur="indefinite" nodeType="mainSeq">
+                <p:childTnLst>
+                  <p:par>
+                    <p:cTn id="3" fill="hold">
+                      <p:stCondLst>
+                        <p:cond delay="indefinite"/>
+                      </p:stCondLst>
+                      <p:childTnLst>
+                        <p:par>
+                          <p:cTn id="4" fill="hold">
+                            <p:stCondLst>
+                              <p:cond delay="0"/>
+                            </p:stCondLst>
+                            <p:childTnLst>
+                              <p:par>
+                                <p:cTn id="5" presetID="2" presetClass="entr" presetSubtype="4" fill="hold" nodeType="clickEffect">
+                                  <p:stCondLst>
+                                    <p:cond delay="0"/>
+                                  </p:stCondLst>
+                                  <p:childTnLst>
+                                    <p:set>
+                                      <p:cBhvr>
+                                        <p:cTn id="6" dur="1" fill="hold">
+                                          <p:stCondLst>
+                                            <p:cond delay="0"/>
+                                          </p:stCondLst>
+                                        </p:cTn>
+                                        <p:tgtEl>
+                                          <p:spTgt spid="8"/>
+                                        </p:tgtEl>
+                                        <p:attrNameLst>
+                                          <p:attrName>style.visibility</p:attrName>
+                                        </p:attrNameLst>
+                                      </p:cBhvr>
+                                      <p:to>
+                                        <p:strVal val="visible"/>
+                                      </p:to>
+                                    </p:set>
+                                    <p:anim calcmode="lin" valueType="num">
+                                      <p:cBhvr additive="base">
+                                        <p:cTn id="7" dur="500" fill="hold"/>
+                                        <p:tgtEl>
+                                          <p:spTgt spid="8"/>
+                                        </p:tgtEl>
+                                        <p:attrNameLst>
+                                          <p:attrName>ppt_x</p:attrName>
+                                        </p:attrNameLst>
+                                      </p:cBhvr>
+                                      <p:tavLst>
+                                        <p:tav tm="0">
+                                          <p:val>
+                                            <p:strVal val="#ppt_x"/>
+                                          </p:val>
+                                        </p:tav>
+                                        <p:tav tm="100000">
+                                          <p:val>
+                                            <p:strVal val="#ppt_x"/>
+                                          </p:val>
+                                        </p:tav>
+                                      </p:tavLst>
+                                    </p:anim>
+                                    <p:anim calcmode="lin" valueType="num">
+                                      <p:cBhvr additive="base">
+                                        <p:cTn id="8" dur="500" fill="hold"/>
+                                        <p:tgtEl>
+                                          <p:spTgt spid="8"/>
+                                        </p:tgtEl>
+                                        <p:attrNameLst>
+                                          <p:attrName>ppt_y</p:attrName>
+                                        </p:attrNameLst>
+                                      </p:cBhvr>
+                                      <p:tavLst>
+                                        <p:tav tm="0">
+                                          <p:val>
+                                            <p:strVal val="1+#ppt_h/2"/>
+                                          </p:val>
+                                        </p:tav>
+                                        <p:tav tm="100000">
+                                          <p:val>
+                                            <p:strVal val="#ppt_y"/>
+                                          </p:val>
+                                        </p:tav>
+                                      </p:tavLst>
+                                    </p:anim>
+                                  </p:childTnLst>
+                                </p:cTn>
+                              </p:par>
+                            </p:childTnLst>
+                          </p:cTn>
+                        </p:par>
+                      </p:childTnLst>
+                    </p:cTn>
+                  </p:par>
+                  <p:par>
+                    <p:cTn id="9" fill="hold">
+                      <p:stCondLst>
+                        <p:cond delay="indefinite"/>
+                      </p:stCondLst>
+                      <p:childTnLst>
+                        <p:par>
+                          <p:cTn id="10" fill="hold">
+                            <p:stCondLst>
+                              <p:cond delay="0"/>
+                            </p:stCondLst>
+                            <p:childTnLst>
+                              <p:par>
+                                <p:cTn id="11" presetID="2" presetClass="entr" presetSubtype="4" fill="hold" nodeType="clickEffect">
+                                  <p:stCondLst>
+                                    <p:cond delay="0"/>
+                                  </p:stCondLst>
+                                  <p:childTnLst>
+                                    <p:set>
+                                      <p:cBhvr>
+                                        <p:cTn id="12" dur="1" fill="hold">
+                                          <p:stCondLst>
+                                            <p:cond delay="0"/>
+                                          </p:stCondLst>
+                                        </p:cTn>
+                                        <p:tgtEl>
+                                          <p:spTgt spid="10"/>
+                                        </p:tgtEl>
+                                        <p:attrNameLst>
+                                          <p:attrName>style.visibility</p:attrName>
+                                        </p:attrNameLst>
+                                      </p:cBhvr>
+                                      <p:to>
+                                        <p:strVal val="visible"/>
+                                      </p:to>
+                                    </p:set>
+                                    <p:anim calcmode="lin" valueType="num">
+                                      <p:cBhvr additive="base">
+                                        <p:cTn id="13" dur="500" fill="hold"/>
+                                        <p:tgtEl>
+                                          <p:spTgt spid="10"/>
+                                        </p:tgtEl>
+                                        <p:attrNameLst>
+                                          <p:attrName>ppt_x</p:attrName>
+                                        </p:attrNameLst>
+                                      </p:cBhvr>
+                                      <p:tavLst>
+                                        <p:tav tm="0">
+                                          <p:val>
+                                            <p:strVal val="#ppt_x"/>
+                                          </p:val>
+                                        </p:tav>
+                                        <p:tav tm="100000">
+                                          <p:val>
+                                            <p:strVal val="#ppt_x"/>
+                                          </p:val>
+                                        </p:tav>
+                                      </p:tavLst>
+                                    </p:anim>
+                                    <p:anim calcmode="lin" valueType="num">
+                                      <p:cBhvr additive="base">
+                                        <p:cTn id="14" dur="500" fill="hold"/>
+                                        <p:tgtEl>
+                                          <p:spTgt spid="10"/>
+                                        </p:tgtEl>
+                                        <p:attrNameLst>
+                                          <p:attrName>ppt_y</p:attrName>
+                                        </p:attrNameLst>
+                                      </p:cBhvr>
+                                      <p:tavLst>
+                                        <p:tav tm="0">
+                                          <p:val>
+                                            <p:strVal val="1+#ppt_h/2"/>
                                           </p:val>
                                         </p:tav>
                                         <p:tav tm="100000">

</xml_diff>